<commit_message>
refactoring text and adding new img
</commit_message>
<xml_diff>
--- a/docs/assets/img/BIMDB_Banner.pptx
+++ b/docs/assets/img/BIMDB_Banner.pptx
@@ -9,6 +9,10 @@
     <p:sldId id="257" r:id="rId3"/>
     <p:sldId id="258" r:id="rId4"/>
     <p:sldId id="259" r:id="rId5"/>
+    <p:sldId id="260" r:id="rId6"/>
+    <p:sldId id="261" r:id="rId7"/>
+    <p:sldId id="262" r:id="rId8"/>
+    <p:sldId id="263" r:id="rId9"/>
   </p:sldIdLst>
   <p:sldSz cx="12192000" cy="6858000"/>
   <p:notesSz cx="6858000" cy="9144000"/>
@@ -107,7 +111,678 @@
       </a:defRPr>
     </a:lvl9pPr>
   </p:defaultTextStyle>
+  <p:extLst>
+    <p:ext uri="{EFAFB233-063F-42B5-8137-9DF3F51BA10A}">
+      <p15:sldGuideLst xmlns:p15="http://schemas.microsoft.com/office/powerpoint/2012/main"/>
+    </p:ext>
+  </p:extLst>
 </p:presentation>
+</file>
+
+<file path=ppt/revisionInfo.xml><?xml version="1.0" encoding="utf-8"?>
+<p1510:revInfo xmlns:a="http://schemas.openxmlformats.org/drawingml/2006/main" xmlns:r="http://schemas.openxmlformats.org/officeDocument/2006/relationships" xmlns:p1510="http://schemas.microsoft.com/office/powerpoint/2015/10/main">
+  <p1510:revLst>
+    <p1510:client id="{7AEAA6BC-FB2E-4615-8233-0F5941A47490}" v="32" dt="2023-04-02T10:46:21.008"/>
+  </p1510:revLst>
+</p1510:revInfo>
+</file>
+
+<file path=ppt/changesInfos/changesInfo1.xml><?xml version="1.0" encoding="utf-8"?>
+<pc:chgInfo xmlns:a="http://schemas.openxmlformats.org/drawingml/2006/main" xmlns:r="http://schemas.openxmlformats.org/officeDocument/2006/relationships" xmlns:ac="http://schemas.microsoft.com/office/drawing/2013/main/command" xmlns:pc="http://schemas.microsoft.com/office/powerpoint/2013/main/command">
+  <pc:docChgLst>
+    <pc:chgData name="Tristan Kindle" userId="725f9a46e00a5a01" providerId="LiveId" clId="{7AEAA6BC-FB2E-4615-8233-0F5941A47490}"/>
+    <pc:docChg chg="undo custSel addSld modSld">
+      <pc:chgData name="Tristan Kindle" userId="725f9a46e00a5a01" providerId="LiveId" clId="{7AEAA6BC-FB2E-4615-8233-0F5941A47490}" dt="2023-04-02T10:45:34.323" v="612" actId="20577"/>
+      <pc:docMkLst>
+        <pc:docMk/>
+      </pc:docMkLst>
+      <pc:sldChg chg="addSp delSp modSp add mod">
+        <pc:chgData name="Tristan Kindle" userId="725f9a46e00a5a01" providerId="LiveId" clId="{7AEAA6BC-FB2E-4615-8233-0F5941A47490}" dt="2023-04-02T10:25:34.028" v="68" actId="1076"/>
+        <pc:sldMkLst>
+          <pc:docMk/>
+          <pc:sldMk cId="1548561688" sldId="260"/>
+        </pc:sldMkLst>
+        <pc:spChg chg="mod">
+          <ac:chgData name="Tristan Kindle" userId="725f9a46e00a5a01" providerId="LiveId" clId="{7AEAA6BC-FB2E-4615-8233-0F5941A47490}" dt="2023-04-02T10:24:16.539" v="55" actId="1076"/>
+          <ac:spMkLst>
+            <pc:docMk/>
+            <pc:sldMk cId="1548561688" sldId="260"/>
+            <ac:spMk id="2" creationId="{FDAA2EFA-E7BF-4AE3-E489-AA7AD4C571B8}"/>
+          </ac:spMkLst>
+        </pc:spChg>
+        <pc:spChg chg="mod">
+          <ac:chgData name="Tristan Kindle" userId="725f9a46e00a5a01" providerId="LiveId" clId="{7AEAA6BC-FB2E-4615-8233-0F5941A47490}" dt="2023-04-02T10:25:12.807" v="66" actId="1076"/>
+          <ac:spMkLst>
+            <pc:docMk/>
+            <pc:sldMk cId="1548561688" sldId="260"/>
+            <ac:spMk id="6" creationId="{E9FDC607-A21E-0365-3867-7653A414059A}"/>
+          </ac:spMkLst>
+        </pc:spChg>
+        <pc:spChg chg="mod">
+          <ac:chgData name="Tristan Kindle" userId="725f9a46e00a5a01" providerId="LiveId" clId="{7AEAA6BC-FB2E-4615-8233-0F5941A47490}" dt="2023-04-02T10:24:13.487" v="54" actId="1076"/>
+          <ac:spMkLst>
+            <pc:docMk/>
+            <pc:sldMk cId="1548561688" sldId="260"/>
+            <ac:spMk id="7" creationId="{8FAE13DB-B562-5D20-405E-AB9B55A8494A}"/>
+          </ac:spMkLst>
+        </pc:spChg>
+        <pc:spChg chg="mod">
+          <ac:chgData name="Tristan Kindle" userId="725f9a46e00a5a01" providerId="LiveId" clId="{7AEAA6BC-FB2E-4615-8233-0F5941A47490}" dt="2023-04-02T10:24:53.353" v="64" actId="1076"/>
+          <ac:spMkLst>
+            <pc:docMk/>
+            <pc:sldMk cId="1548561688" sldId="260"/>
+            <ac:spMk id="11" creationId="{EF2C0E13-220A-1025-3C11-1EC5709FBBB9}"/>
+          </ac:spMkLst>
+        </pc:spChg>
+        <pc:spChg chg="del mod">
+          <ac:chgData name="Tristan Kindle" userId="725f9a46e00a5a01" providerId="LiveId" clId="{7AEAA6BC-FB2E-4615-8233-0F5941A47490}" dt="2023-04-02T10:25:08.059" v="65" actId="478"/>
+          <ac:spMkLst>
+            <pc:docMk/>
+            <pc:sldMk cId="1548561688" sldId="260"/>
+            <ac:spMk id="12" creationId="{909CF759-EB67-6548-4E9D-EA139AC90076}"/>
+          </ac:spMkLst>
+        </pc:spChg>
+        <pc:spChg chg="mod">
+          <ac:chgData name="Tristan Kindle" userId="725f9a46e00a5a01" providerId="LiveId" clId="{7AEAA6BC-FB2E-4615-8233-0F5941A47490}" dt="2023-04-02T10:24:43.605" v="62" actId="1076"/>
+          <ac:spMkLst>
+            <pc:docMk/>
+            <pc:sldMk cId="1548561688" sldId="260"/>
+            <ac:spMk id="17" creationId="{3EAA8C99-D42E-FADE-E174-B8B6DD8EC026}"/>
+          </ac:spMkLst>
+        </pc:spChg>
+        <pc:spChg chg="mod">
+          <ac:chgData name="Tristan Kindle" userId="725f9a46e00a5a01" providerId="LiveId" clId="{7AEAA6BC-FB2E-4615-8233-0F5941A47490}" dt="2023-04-02T10:24:24.613" v="58" actId="1076"/>
+          <ac:spMkLst>
+            <pc:docMk/>
+            <pc:sldMk cId="1548561688" sldId="260"/>
+            <ac:spMk id="20" creationId="{9F49B6A4-F26C-9D62-AF96-13AF935534BE}"/>
+          </ac:spMkLst>
+        </pc:spChg>
+        <pc:picChg chg="del mod">
+          <ac:chgData name="Tristan Kindle" userId="725f9a46e00a5a01" providerId="LiveId" clId="{7AEAA6BC-FB2E-4615-8233-0F5941A47490}" dt="2023-04-02T10:25:08.059" v="65" actId="478"/>
+          <ac:picMkLst>
+            <pc:docMk/>
+            <pc:sldMk cId="1548561688" sldId="260"/>
+            <ac:picMk id="3" creationId="{52FD53E6-E0A8-0990-0686-AFA0994C95B7}"/>
+          </ac:picMkLst>
+        </pc:picChg>
+        <pc:picChg chg="mod">
+          <ac:chgData name="Tristan Kindle" userId="725f9a46e00a5a01" providerId="LiveId" clId="{7AEAA6BC-FB2E-4615-8233-0F5941A47490}" dt="2023-04-02T10:25:12.807" v="66" actId="1076"/>
+          <ac:picMkLst>
+            <pc:docMk/>
+            <pc:sldMk cId="1548561688" sldId="260"/>
+            <ac:picMk id="5" creationId="{92B0EB9C-1D5D-AD7E-11FC-C9C1F25D5816}"/>
+          </ac:picMkLst>
+        </pc:picChg>
+        <pc:picChg chg="mod">
+          <ac:chgData name="Tristan Kindle" userId="725f9a46e00a5a01" providerId="LiveId" clId="{7AEAA6BC-FB2E-4615-8233-0F5941A47490}" dt="2023-04-02T10:24:53.353" v="64" actId="1076"/>
+          <ac:picMkLst>
+            <pc:docMk/>
+            <pc:sldMk cId="1548561688" sldId="260"/>
+            <ac:picMk id="10" creationId="{CE49BD2A-B1B3-7286-99DC-D29CEF6E5E46}"/>
+          </ac:picMkLst>
+        </pc:picChg>
+        <pc:picChg chg="mod">
+          <ac:chgData name="Tristan Kindle" userId="725f9a46e00a5a01" providerId="LiveId" clId="{7AEAA6BC-FB2E-4615-8233-0F5941A47490}" dt="2023-04-02T10:24:13.487" v="54" actId="1076"/>
+          <ac:picMkLst>
+            <pc:docMk/>
+            <pc:sldMk cId="1548561688" sldId="260"/>
+            <ac:picMk id="13" creationId="{4755FEB8-8C01-93CA-849F-038D33FB3116}"/>
+          </ac:picMkLst>
+        </pc:picChg>
+        <pc:picChg chg="add mod">
+          <ac:chgData name="Tristan Kindle" userId="725f9a46e00a5a01" providerId="LiveId" clId="{7AEAA6BC-FB2E-4615-8233-0F5941A47490}" dt="2023-04-02T10:25:34.028" v="68" actId="1076"/>
+          <ac:picMkLst>
+            <pc:docMk/>
+            <pc:sldMk cId="1548561688" sldId="260"/>
+            <ac:picMk id="14" creationId="{EDE40265-8EB4-D083-CB0F-58E5982D611D}"/>
+          </ac:picMkLst>
+        </pc:picChg>
+        <pc:picChg chg="mod">
+          <ac:chgData name="Tristan Kindle" userId="725f9a46e00a5a01" providerId="LiveId" clId="{7AEAA6BC-FB2E-4615-8233-0F5941A47490}" dt="2023-04-02T10:24:16.539" v="55" actId="1076"/>
+          <ac:picMkLst>
+            <pc:docMk/>
+            <pc:sldMk cId="1548561688" sldId="260"/>
+            <ac:picMk id="15" creationId="{BCE2EA1A-54B0-09CE-0725-EE8ABD5278D9}"/>
+          </ac:picMkLst>
+        </pc:picChg>
+        <pc:picChg chg="mod">
+          <ac:chgData name="Tristan Kindle" userId="725f9a46e00a5a01" providerId="LiveId" clId="{7AEAA6BC-FB2E-4615-8233-0F5941A47490}" dt="2023-04-02T10:24:43.605" v="62" actId="1076"/>
+          <ac:picMkLst>
+            <pc:docMk/>
+            <pc:sldMk cId="1548561688" sldId="260"/>
+            <ac:picMk id="16" creationId="{7260DE25-F326-9D69-E8FC-534071C44E49}"/>
+          </ac:picMkLst>
+        </pc:picChg>
+        <pc:picChg chg="mod">
+          <ac:chgData name="Tristan Kindle" userId="725f9a46e00a5a01" providerId="LiveId" clId="{7AEAA6BC-FB2E-4615-8233-0F5941A47490}" dt="2023-04-02T10:24:24.613" v="58" actId="1076"/>
+          <ac:picMkLst>
+            <pc:docMk/>
+            <pc:sldMk cId="1548561688" sldId="260"/>
+            <ac:picMk id="19" creationId="{A958ABB5-D3AC-667F-E669-81381CDEF859}"/>
+          </ac:picMkLst>
+        </pc:picChg>
+        <pc:picChg chg="del">
+          <ac:chgData name="Tristan Kindle" userId="725f9a46e00a5a01" providerId="LiveId" clId="{7AEAA6BC-FB2E-4615-8233-0F5941A47490}" dt="2023-04-02T10:23:14.549" v="1" actId="478"/>
+          <ac:picMkLst>
+            <pc:docMk/>
+            <pc:sldMk cId="1548561688" sldId="260"/>
+            <ac:picMk id="22" creationId="{9D6D18F6-D0E1-320E-A37C-DDDC7461CA3A}"/>
+          </ac:picMkLst>
+        </pc:picChg>
+      </pc:sldChg>
+      <pc:sldChg chg="addSp delSp modSp add mod">
+        <pc:chgData name="Tristan Kindle" userId="725f9a46e00a5a01" providerId="LiveId" clId="{7AEAA6BC-FB2E-4615-8233-0F5941A47490}" dt="2023-04-02T10:32:23.427" v="234" actId="20577"/>
+        <pc:sldMkLst>
+          <pc:docMk/>
+          <pc:sldMk cId="2176997230" sldId="261"/>
+        </pc:sldMkLst>
+        <pc:spChg chg="del">
+          <ac:chgData name="Tristan Kindle" userId="725f9a46e00a5a01" providerId="LiveId" clId="{7AEAA6BC-FB2E-4615-8233-0F5941A47490}" dt="2023-04-02T10:25:56.852" v="72" actId="478"/>
+          <ac:spMkLst>
+            <pc:docMk/>
+            <pc:sldMk cId="2176997230" sldId="261"/>
+            <ac:spMk id="2" creationId="{FDAA2EFA-E7BF-4AE3-E489-AA7AD4C571B8}"/>
+          </ac:spMkLst>
+        </pc:spChg>
+        <pc:spChg chg="del">
+          <ac:chgData name="Tristan Kindle" userId="725f9a46e00a5a01" providerId="LiveId" clId="{7AEAA6BC-FB2E-4615-8233-0F5941A47490}" dt="2023-04-02T10:25:54.909" v="70" actId="478"/>
+          <ac:spMkLst>
+            <pc:docMk/>
+            <pc:sldMk cId="2176997230" sldId="261"/>
+            <ac:spMk id="6" creationId="{E9FDC607-A21E-0365-3867-7653A414059A}"/>
+          </ac:spMkLst>
+        </pc:spChg>
+        <pc:spChg chg="del">
+          <ac:chgData name="Tristan Kindle" userId="725f9a46e00a5a01" providerId="LiveId" clId="{7AEAA6BC-FB2E-4615-8233-0F5941A47490}" dt="2023-04-02T10:25:54.909" v="70" actId="478"/>
+          <ac:spMkLst>
+            <pc:docMk/>
+            <pc:sldMk cId="2176997230" sldId="261"/>
+            <ac:spMk id="7" creationId="{8FAE13DB-B562-5D20-405E-AB9B55A8494A}"/>
+          </ac:spMkLst>
+        </pc:spChg>
+        <pc:spChg chg="del">
+          <ac:chgData name="Tristan Kindle" userId="725f9a46e00a5a01" providerId="LiveId" clId="{7AEAA6BC-FB2E-4615-8233-0F5941A47490}" dt="2023-04-02T10:25:54.909" v="70" actId="478"/>
+          <ac:spMkLst>
+            <pc:docMk/>
+            <pc:sldMk cId="2176997230" sldId="261"/>
+            <ac:spMk id="9" creationId="{F7B74170-B682-A4DE-8CA6-8C4D76020310}"/>
+          </ac:spMkLst>
+        </pc:spChg>
+        <pc:spChg chg="del">
+          <ac:chgData name="Tristan Kindle" userId="725f9a46e00a5a01" providerId="LiveId" clId="{7AEAA6BC-FB2E-4615-8233-0F5941A47490}" dt="2023-04-02T10:25:54.909" v="70" actId="478"/>
+          <ac:spMkLst>
+            <pc:docMk/>
+            <pc:sldMk cId="2176997230" sldId="261"/>
+            <ac:spMk id="11" creationId="{EF2C0E13-220A-1025-3C11-1EC5709FBBB9}"/>
+          </ac:spMkLst>
+        </pc:spChg>
+        <pc:spChg chg="del">
+          <ac:chgData name="Tristan Kindle" userId="725f9a46e00a5a01" providerId="LiveId" clId="{7AEAA6BC-FB2E-4615-8233-0F5941A47490}" dt="2023-04-02T10:25:54.909" v="70" actId="478"/>
+          <ac:spMkLst>
+            <pc:docMk/>
+            <pc:sldMk cId="2176997230" sldId="261"/>
+            <ac:spMk id="17" creationId="{3EAA8C99-D42E-FADE-E174-B8B6DD8EC026}"/>
+          </ac:spMkLst>
+        </pc:spChg>
+        <pc:spChg chg="del">
+          <ac:chgData name="Tristan Kindle" userId="725f9a46e00a5a01" providerId="LiveId" clId="{7AEAA6BC-FB2E-4615-8233-0F5941A47490}" dt="2023-04-02T10:25:54.909" v="70" actId="478"/>
+          <ac:spMkLst>
+            <pc:docMk/>
+            <pc:sldMk cId="2176997230" sldId="261"/>
+            <ac:spMk id="20" creationId="{9F49B6A4-F26C-9D62-AF96-13AF935534BE}"/>
+          </ac:spMkLst>
+        </pc:spChg>
+        <pc:spChg chg="del">
+          <ac:chgData name="Tristan Kindle" userId="725f9a46e00a5a01" providerId="LiveId" clId="{7AEAA6BC-FB2E-4615-8233-0F5941A47490}" dt="2023-04-02T10:25:54.909" v="70" actId="478"/>
+          <ac:spMkLst>
+            <pc:docMk/>
+            <pc:sldMk cId="2176997230" sldId="261"/>
+            <ac:spMk id="21" creationId="{56E18752-6B2C-1838-E1C5-26A37A501450}"/>
+          </ac:spMkLst>
+        </pc:spChg>
+        <pc:spChg chg="add del mod">
+          <ac:chgData name="Tristan Kindle" userId="725f9a46e00a5a01" providerId="LiveId" clId="{7AEAA6BC-FB2E-4615-8233-0F5941A47490}" dt="2023-04-02T10:27:07.113" v="87" actId="478"/>
+          <ac:spMkLst>
+            <pc:docMk/>
+            <pc:sldMk cId="2176997230" sldId="261"/>
+            <ac:spMk id="22" creationId="{2828B3D2-DDC2-48BC-507A-65EBF11B35A7}"/>
+          </ac:spMkLst>
+        </pc:spChg>
+        <pc:spChg chg="add mod">
+          <ac:chgData name="Tristan Kindle" userId="725f9a46e00a5a01" providerId="LiveId" clId="{7AEAA6BC-FB2E-4615-8233-0F5941A47490}" dt="2023-04-02T10:27:36.854" v="97" actId="1076"/>
+          <ac:spMkLst>
+            <pc:docMk/>
+            <pc:sldMk cId="2176997230" sldId="261"/>
+            <ac:spMk id="23" creationId="{3AC62F3B-0D44-3AE2-6480-AAFA27EC7650}"/>
+          </ac:spMkLst>
+        </pc:spChg>
+        <pc:spChg chg="add mod">
+          <ac:chgData name="Tristan Kindle" userId="725f9a46e00a5a01" providerId="LiveId" clId="{7AEAA6BC-FB2E-4615-8233-0F5941A47490}" dt="2023-04-02T10:31:36.309" v="165" actId="207"/>
+          <ac:spMkLst>
+            <pc:docMk/>
+            <pc:sldMk cId="2176997230" sldId="261"/>
+            <ac:spMk id="30" creationId="{DE06A5FD-A4F4-0448-B096-4D34547B85C0}"/>
+          </ac:spMkLst>
+        </pc:spChg>
+        <pc:spChg chg="add mod">
+          <ac:chgData name="Tristan Kindle" userId="725f9a46e00a5a01" providerId="LiveId" clId="{7AEAA6BC-FB2E-4615-8233-0F5941A47490}" dt="2023-04-02T10:31:36.309" v="165" actId="207"/>
+          <ac:spMkLst>
+            <pc:docMk/>
+            <pc:sldMk cId="2176997230" sldId="261"/>
+            <ac:spMk id="33" creationId="{FBBADA8C-5B21-6992-7CC9-292F74D3CE67}"/>
+          </ac:spMkLst>
+        </pc:spChg>
+        <pc:spChg chg="add mod">
+          <ac:chgData name="Tristan Kindle" userId="725f9a46e00a5a01" providerId="LiveId" clId="{7AEAA6BC-FB2E-4615-8233-0F5941A47490}" dt="2023-04-02T10:32:04.623" v="211" actId="1076"/>
+          <ac:spMkLst>
+            <pc:docMk/>
+            <pc:sldMk cId="2176997230" sldId="261"/>
+            <ac:spMk id="37" creationId="{28A1C021-EDC9-4666-C131-8B33DBFD243D}"/>
+          </ac:spMkLst>
+        </pc:spChg>
+        <pc:spChg chg="add mod">
+          <ac:chgData name="Tristan Kindle" userId="725f9a46e00a5a01" providerId="LiveId" clId="{7AEAA6BC-FB2E-4615-8233-0F5941A47490}" dt="2023-04-02T10:32:23.427" v="234" actId="20577"/>
+          <ac:spMkLst>
+            <pc:docMk/>
+            <pc:sldMk cId="2176997230" sldId="261"/>
+            <ac:spMk id="38" creationId="{317D0827-958F-63C6-3413-88147A3D08C5}"/>
+          </ac:spMkLst>
+        </pc:spChg>
+        <pc:picChg chg="add del mod">
+          <ac:chgData name="Tristan Kindle" userId="725f9a46e00a5a01" providerId="LiveId" clId="{7AEAA6BC-FB2E-4615-8233-0F5941A47490}" dt="2023-04-02T10:26:48.539" v="81" actId="478"/>
+          <ac:picMkLst>
+            <pc:docMk/>
+            <pc:sldMk cId="2176997230" sldId="261"/>
+            <ac:picMk id="4" creationId="{CA6411BC-A2EC-3470-B6F3-43BDCC1EFED5}"/>
+          </ac:picMkLst>
+        </pc:picChg>
+        <pc:picChg chg="del">
+          <ac:chgData name="Tristan Kindle" userId="725f9a46e00a5a01" providerId="LiveId" clId="{7AEAA6BC-FB2E-4615-8233-0F5941A47490}" dt="2023-04-02T10:25:54.909" v="70" actId="478"/>
+          <ac:picMkLst>
+            <pc:docMk/>
+            <pc:sldMk cId="2176997230" sldId="261"/>
+            <ac:picMk id="5" creationId="{92B0EB9C-1D5D-AD7E-11FC-C9C1F25D5816}"/>
+          </ac:picMkLst>
+        </pc:picChg>
+        <pc:picChg chg="del">
+          <ac:chgData name="Tristan Kindle" userId="725f9a46e00a5a01" providerId="LiveId" clId="{7AEAA6BC-FB2E-4615-8233-0F5941A47490}" dt="2023-04-02T10:25:54.909" v="70" actId="478"/>
+          <ac:picMkLst>
+            <pc:docMk/>
+            <pc:sldMk cId="2176997230" sldId="261"/>
+            <ac:picMk id="8" creationId="{21FF6093-2786-5D7C-707F-3229D60442B1}"/>
+          </ac:picMkLst>
+        </pc:picChg>
+        <pc:picChg chg="del">
+          <ac:chgData name="Tristan Kindle" userId="725f9a46e00a5a01" providerId="LiveId" clId="{7AEAA6BC-FB2E-4615-8233-0F5941A47490}" dt="2023-04-02T10:25:54.909" v="70" actId="478"/>
+          <ac:picMkLst>
+            <pc:docMk/>
+            <pc:sldMk cId="2176997230" sldId="261"/>
+            <ac:picMk id="10" creationId="{CE49BD2A-B1B3-7286-99DC-D29CEF6E5E46}"/>
+          </ac:picMkLst>
+        </pc:picChg>
+        <pc:picChg chg="del">
+          <ac:chgData name="Tristan Kindle" userId="725f9a46e00a5a01" providerId="LiveId" clId="{7AEAA6BC-FB2E-4615-8233-0F5941A47490}" dt="2023-04-02T10:25:54.909" v="70" actId="478"/>
+          <ac:picMkLst>
+            <pc:docMk/>
+            <pc:sldMk cId="2176997230" sldId="261"/>
+            <ac:picMk id="13" creationId="{4755FEB8-8C01-93CA-849F-038D33FB3116}"/>
+          </ac:picMkLst>
+        </pc:picChg>
+        <pc:picChg chg="del">
+          <ac:chgData name="Tristan Kindle" userId="725f9a46e00a5a01" providerId="LiveId" clId="{7AEAA6BC-FB2E-4615-8233-0F5941A47490}" dt="2023-04-02T10:25:55.651" v="71" actId="478"/>
+          <ac:picMkLst>
+            <pc:docMk/>
+            <pc:sldMk cId="2176997230" sldId="261"/>
+            <ac:picMk id="14" creationId="{EDE40265-8EB4-D083-CB0F-58E5982D611D}"/>
+          </ac:picMkLst>
+        </pc:picChg>
+        <pc:picChg chg="del">
+          <ac:chgData name="Tristan Kindle" userId="725f9a46e00a5a01" providerId="LiveId" clId="{7AEAA6BC-FB2E-4615-8233-0F5941A47490}" dt="2023-04-02T10:25:56.852" v="72" actId="478"/>
+          <ac:picMkLst>
+            <pc:docMk/>
+            <pc:sldMk cId="2176997230" sldId="261"/>
+            <ac:picMk id="15" creationId="{BCE2EA1A-54B0-09CE-0725-EE8ABD5278D9}"/>
+          </ac:picMkLst>
+        </pc:picChg>
+        <pc:picChg chg="del">
+          <ac:chgData name="Tristan Kindle" userId="725f9a46e00a5a01" providerId="LiveId" clId="{7AEAA6BC-FB2E-4615-8233-0F5941A47490}" dt="2023-04-02T10:25:54.909" v="70" actId="478"/>
+          <ac:picMkLst>
+            <pc:docMk/>
+            <pc:sldMk cId="2176997230" sldId="261"/>
+            <ac:picMk id="16" creationId="{7260DE25-F326-9D69-E8FC-534071C44E49}"/>
+          </ac:picMkLst>
+        </pc:picChg>
+        <pc:picChg chg="add mod">
+          <ac:chgData name="Tristan Kindle" userId="725f9a46e00a5a01" providerId="LiveId" clId="{7AEAA6BC-FB2E-4615-8233-0F5941A47490}" dt="2023-04-02T10:30:37.525" v="147" actId="1076"/>
+          <ac:picMkLst>
+            <pc:docMk/>
+            <pc:sldMk cId="2176997230" sldId="261"/>
+            <ac:picMk id="18" creationId="{A7D45A6C-38DD-D8D3-0F09-3664A204B36B}"/>
+          </ac:picMkLst>
+        </pc:picChg>
+        <pc:picChg chg="del">
+          <ac:chgData name="Tristan Kindle" userId="725f9a46e00a5a01" providerId="LiveId" clId="{7AEAA6BC-FB2E-4615-8233-0F5941A47490}" dt="2023-04-02T10:25:54.909" v="70" actId="478"/>
+          <ac:picMkLst>
+            <pc:docMk/>
+            <pc:sldMk cId="2176997230" sldId="261"/>
+            <ac:picMk id="19" creationId="{A958ABB5-D3AC-667F-E669-81381CDEF859}"/>
+          </ac:picMkLst>
+        </pc:picChg>
+        <pc:picChg chg="add mod">
+          <ac:chgData name="Tristan Kindle" userId="725f9a46e00a5a01" providerId="LiveId" clId="{7AEAA6BC-FB2E-4615-8233-0F5941A47490}" dt="2023-04-02T10:28:06.127" v="102" actId="1076"/>
+          <ac:picMkLst>
+            <pc:docMk/>
+            <pc:sldMk cId="2176997230" sldId="261"/>
+            <ac:picMk id="25" creationId="{D4CC9D33-6BF7-2DAE-B1F5-C9488A5707C5}"/>
+          </ac:picMkLst>
+        </pc:picChg>
+        <pc:picChg chg="add mod">
+          <ac:chgData name="Tristan Kindle" userId="725f9a46e00a5a01" providerId="LiveId" clId="{7AEAA6BC-FB2E-4615-8233-0F5941A47490}" dt="2023-04-02T10:30:46.364" v="154" actId="1037"/>
+          <ac:picMkLst>
+            <pc:docMk/>
+            <pc:sldMk cId="2176997230" sldId="261"/>
+            <ac:picMk id="29" creationId="{331D34B7-C56C-BD84-5ECC-8373B26BC057}"/>
+          </ac:picMkLst>
+        </pc:picChg>
+        <pc:picChg chg="add mod">
+          <ac:chgData name="Tristan Kindle" userId="725f9a46e00a5a01" providerId="LiveId" clId="{7AEAA6BC-FB2E-4615-8233-0F5941A47490}" dt="2023-04-02T10:30:46.364" v="154" actId="1037"/>
+          <ac:picMkLst>
+            <pc:docMk/>
+            <pc:sldMk cId="2176997230" sldId="261"/>
+            <ac:picMk id="32" creationId="{065625AF-6A5F-0800-3BC8-01810D6DEDD2}"/>
+          </ac:picMkLst>
+        </pc:picChg>
+        <pc:picChg chg="add mod">
+          <ac:chgData name="Tristan Kindle" userId="725f9a46e00a5a01" providerId="LiveId" clId="{7AEAA6BC-FB2E-4615-8233-0F5941A47490}" dt="2023-04-02T10:31:25.105" v="159" actId="1076"/>
+          <ac:picMkLst>
+            <pc:docMk/>
+            <pc:sldMk cId="2176997230" sldId="261"/>
+            <ac:picMk id="36" creationId="{87CF94EF-6E75-88B8-D48F-CEA46611794A}"/>
+          </ac:picMkLst>
+        </pc:picChg>
+        <pc:inkChg chg="add del">
+          <ac:chgData name="Tristan Kindle" userId="725f9a46e00a5a01" providerId="LiveId" clId="{7AEAA6BC-FB2E-4615-8233-0F5941A47490}" dt="2023-04-02T10:30:56.916" v="156" actId="9405"/>
+          <ac:inkMkLst>
+            <pc:docMk/>
+            <pc:sldMk cId="2176997230" sldId="261"/>
+            <ac:inkMk id="34" creationId="{64C299FA-F2C7-53B3-4356-773577485BEE}"/>
+          </ac:inkMkLst>
+        </pc:inkChg>
+        <pc:cxnChg chg="add mod">
+          <ac:chgData name="Tristan Kindle" userId="725f9a46e00a5a01" providerId="LiveId" clId="{7AEAA6BC-FB2E-4615-8233-0F5941A47490}" dt="2023-04-02T10:30:31.531" v="141" actId="1035"/>
+          <ac:cxnSpMkLst>
+            <pc:docMk/>
+            <pc:sldMk cId="2176997230" sldId="261"/>
+            <ac:cxnSpMk id="27" creationId="{4BAB1880-A23D-7E0D-D8A8-71638D76DBB2}"/>
+          </ac:cxnSpMkLst>
+        </pc:cxnChg>
+      </pc:sldChg>
+      <pc:sldChg chg="addSp delSp modSp add mod">
+        <pc:chgData name="Tristan Kindle" userId="725f9a46e00a5a01" providerId="LiveId" clId="{7AEAA6BC-FB2E-4615-8233-0F5941A47490}" dt="2023-04-02T10:39:37.170" v="321" actId="1076"/>
+        <pc:sldMkLst>
+          <pc:docMk/>
+          <pc:sldMk cId="510295249" sldId="262"/>
+        </pc:sldMkLst>
+        <pc:spChg chg="add del mod">
+          <ac:chgData name="Tristan Kindle" userId="725f9a46e00a5a01" providerId="LiveId" clId="{7AEAA6BC-FB2E-4615-8233-0F5941A47490}" dt="2023-04-02T10:36:49.999" v="240" actId="22"/>
+          <ac:spMkLst>
+            <pc:docMk/>
+            <pc:sldMk cId="510295249" sldId="262"/>
+            <ac:spMk id="3" creationId="{9D941808-93AB-E653-EC35-812A74D5FBBB}"/>
+          </ac:spMkLst>
+        </pc:spChg>
+        <pc:spChg chg="add mod">
+          <ac:chgData name="Tristan Kindle" userId="725f9a46e00a5a01" providerId="LiveId" clId="{7AEAA6BC-FB2E-4615-8233-0F5941A47490}" dt="2023-04-02T10:38:27.042" v="266" actId="404"/>
+          <ac:spMkLst>
+            <pc:docMk/>
+            <pc:sldMk cId="510295249" sldId="262"/>
+            <ac:spMk id="4" creationId="{D47AB2CB-4503-2DBF-0E54-6D6C978871D2}"/>
+          </ac:spMkLst>
+        </pc:spChg>
+        <pc:spChg chg="add del mod">
+          <ac:chgData name="Tristan Kindle" userId="725f9a46e00a5a01" providerId="LiveId" clId="{7AEAA6BC-FB2E-4615-8233-0F5941A47490}" dt="2023-04-02T10:37:00.862" v="244"/>
+          <ac:spMkLst>
+            <pc:docMk/>
+            <pc:sldMk cId="510295249" sldId="262"/>
+            <ac:spMk id="5" creationId="{7B891669-F1C6-42B4-5347-59068B862149}"/>
+          </ac:spMkLst>
+        </pc:spChg>
+        <pc:spChg chg="add del">
+          <ac:chgData name="Tristan Kindle" userId="725f9a46e00a5a01" providerId="LiveId" clId="{7AEAA6BC-FB2E-4615-8233-0F5941A47490}" dt="2023-04-02T10:38:40.648" v="268" actId="22"/>
+          <ac:spMkLst>
+            <pc:docMk/>
+            <pc:sldMk cId="510295249" sldId="262"/>
+            <ac:spMk id="13" creationId="{A8879AF6-526C-A83E-3130-06E358B97D43}"/>
+          </ac:spMkLst>
+        </pc:spChg>
+        <pc:spChg chg="add mod">
+          <ac:chgData name="Tristan Kindle" userId="725f9a46e00a5a01" providerId="LiveId" clId="{7AEAA6BC-FB2E-4615-8233-0F5941A47490}" dt="2023-04-02T10:39:21.788" v="288" actId="1076"/>
+          <ac:spMkLst>
+            <pc:docMk/>
+            <pc:sldMk cId="510295249" sldId="262"/>
+            <ac:spMk id="15" creationId="{60D202F3-31F8-0FE6-106D-CE5543BA88AD}"/>
+          </ac:spMkLst>
+        </pc:spChg>
+        <pc:spChg chg="add del mod">
+          <ac:chgData name="Tristan Kindle" userId="725f9a46e00a5a01" providerId="LiveId" clId="{7AEAA6BC-FB2E-4615-8233-0F5941A47490}" dt="2023-04-02T10:39:10.445" v="285"/>
+          <ac:spMkLst>
+            <pc:docMk/>
+            <pc:sldMk cId="510295249" sldId="262"/>
+            <ac:spMk id="16" creationId="{5EDC900D-AEE5-A9C5-8A25-A55EBE14211C}"/>
+          </ac:spMkLst>
+        </pc:spChg>
+        <pc:spChg chg="add mod">
+          <ac:chgData name="Tristan Kindle" userId="725f9a46e00a5a01" providerId="LiveId" clId="{7AEAA6BC-FB2E-4615-8233-0F5941A47490}" dt="2023-04-02T10:39:37.170" v="321" actId="1076"/>
+          <ac:spMkLst>
+            <pc:docMk/>
+            <pc:sldMk cId="510295249" sldId="262"/>
+            <ac:spMk id="17" creationId="{81A7794A-58D1-9DD6-78EB-E52BD6899D15}"/>
+          </ac:spMkLst>
+        </pc:spChg>
+        <pc:spChg chg="del">
+          <ac:chgData name="Tristan Kindle" userId="725f9a46e00a5a01" providerId="LiveId" clId="{7AEAA6BC-FB2E-4615-8233-0F5941A47490}" dt="2023-04-02T10:36:34.684" v="236" actId="478"/>
+          <ac:spMkLst>
+            <pc:docMk/>
+            <pc:sldMk cId="510295249" sldId="262"/>
+            <ac:spMk id="30" creationId="{DE06A5FD-A4F4-0448-B096-4D34547B85C0}"/>
+          </ac:spMkLst>
+        </pc:spChg>
+        <pc:spChg chg="del">
+          <ac:chgData name="Tristan Kindle" userId="725f9a46e00a5a01" providerId="LiveId" clId="{7AEAA6BC-FB2E-4615-8233-0F5941A47490}" dt="2023-04-02T10:36:34.684" v="236" actId="478"/>
+          <ac:spMkLst>
+            <pc:docMk/>
+            <pc:sldMk cId="510295249" sldId="262"/>
+            <ac:spMk id="33" creationId="{FBBADA8C-5B21-6992-7CC9-292F74D3CE67}"/>
+          </ac:spMkLst>
+        </pc:spChg>
+        <pc:spChg chg="del">
+          <ac:chgData name="Tristan Kindle" userId="725f9a46e00a5a01" providerId="LiveId" clId="{7AEAA6BC-FB2E-4615-8233-0F5941A47490}" dt="2023-04-02T10:36:34.684" v="236" actId="478"/>
+          <ac:spMkLst>
+            <pc:docMk/>
+            <pc:sldMk cId="510295249" sldId="262"/>
+            <ac:spMk id="37" creationId="{28A1C021-EDC9-4666-C131-8B33DBFD243D}"/>
+          </ac:spMkLst>
+        </pc:spChg>
+        <pc:spChg chg="del">
+          <ac:chgData name="Tristan Kindle" userId="725f9a46e00a5a01" providerId="LiveId" clId="{7AEAA6BC-FB2E-4615-8233-0F5941A47490}" dt="2023-04-02T10:36:34.684" v="236" actId="478"/>
+          <ac:spMkLst>
+            <pc:docMk/>
+            <pc:sldMk cId="510295249" sldId="262"/>
+            <ac:spMk id="38" creationId="{317D0827-958F-63C6-3413-88147A3D08C5}"/>
+          </ac:spMkLst>
+        </pc:spChg>
+        <pc:picChg chg="add mod">
+          <ac:chgData name="Tristan Kindle" userId="725f9a46e00a5a01" providerId="LiveId" clId="{7AEAA6BC-FB2E-4615-8233-0F5941A47490}" dt="2023-04-02T10:39:09.140" v="284" actId="1076"/>
+          <ac:picMkLst>
+            <pc:docMk/>
+            <pc:sldMk cId="510295249" sldId="262"/>
+            <ac:picMk id="7" creationId="{168A16D3-9FBF-3132-971C-8D75FDF1D61B}"/>
+          </ac:picMkLst>
+        </pc:picChg>
+        <pc:picChg chg="add del mod">
+          <ac:chgData name="Tristan Kindle" userId="725f9a46e00a5a01" providerId="LiveId" clId="{7AEAA6BC-FB2E-4615-8233-0F5941A47490}" dt="2023-04-02T10:37:57.379" v="258" actId="478"/>
+          <ac:picMkLst>
+            <pc:docMk/>
+            <pc:sldMk cId="510295249" sldId="262"/>
+            <ac:picMk id="9" creationId="{834CCEAC-797D-354E-F69D-4B6D89DDA022}"/>
+          </ac:picMkLst>
+        </pc:picChg>
+        <pc:picChg chg="add mod">
+          <ac:chgData name="Tristan Kindle" userId="725f9a46e00a5a01" providerId="LiveId" clId="{7AEAA6BC-FB2E-4615-8233-0F5941A47490}" dt="2023-04-02T10:38:14.008" v="263" actId="14100"/>
+          <ac:picMkLst>
+            <pc:docMk/>
+            <pc:sldMk cId="510295249" sldId="262"/>
+            <ac:picMk id="11" creationId="{0A8101AC-E979-5460-87B7-A12425562F41}"/>
+          </ac:picMkLst>
+        </pc:picChg>
+        <pc:picChg chg="del">
+          <ac:chgData name="Tristan Kindle" userId="725f9a46e00a5a01" providerId="LiveId" clId="{7AEAA6BC-FB2E-4615-8233-0F5941A47490}" dt="2023-04-02T10:36:34.684" v="236" actId="478"/>
+          <ac:picMkLst>
+            <pc:docMk/>
+            <pc:sldMk cId="510295249" sldId="262"/>
+            <ac:picMk id="29" creationId="{331D34B7-C56C-BD84-5ECC-8373B26BC057}"/>
+          </ac:picMkLst>
+        </pc:picChg>
+        <pc:picChg chg="del">
+          <ac:chgData name="Tristan Kindle" userId="725f9a46e00a5a01" providerId="LiveId" clId="{7AEAA6BC-FB2E-4615-8233-0F5941A47490}" dt="2023-04-02T10:36:34.684" v="236" actId="478"/>
+          <ac:picMkLst>
+            <pc:docMk/>
+            <pc:sldMk cId="510295249" sldId="262"/>
+            <ac:picMk id="32" creationId="{065625AF-6A5F-0800-3BC8-01810D6DEDD2}"/>
+          </ac:picMkLst>
+        </pc:picChg>
+        <pc:picChg chg="del">
+          <ac:chgData name="Tristan Kindle" userId="725f9a46e00a5a01" providerId="LiveId" clId="{7AEAA6BC-FB2E-4615-8233-0F5941A47490}" dt="2023-04-02T10:36:34.684" v="236" actId="478"/>
+          <ac:picMkLst>
+            <pc:docMk/>
+            <pc:sldMk cId="510295249" sldId="262"/>
+            <ac:picMk id="36" creationId="{87CF94EF-6E75-88B8-D48F-CEA46611794A}"/>
+          </ac:picMkLst>
+        </pc:picChg>
+      </pc:sldChg>
+      <pc:sldChg chg="addSp delSp modSp add mod">
+        <pc:chgData name="Tristan Kindle" userId="725f9a46e00a5a01" providerId="LiveId" clId="{7AEAA6BC-FB2E-4615-8233-0F5941A47490}" dt="2023-04-02T10:45:34.323" v="612" actId="20577"/>
+        <pc:sldMkLst>
+          <pc:docMk/>
+          <pc:sldMk cId="2241053905" sldId="263"/>
+        </pc:sldMkLst>
+        <pc:spChg chg="mod">
+          <ac:chgData name="Tristan Kindle" userId="725f9a46e00a5a01" providerId="LiveId" clId="{7AEAA6BC-FB2E-4615-8233-0F5941A47490}" dt="2023-04-02T10:41:13.154" v="363" actId="20577"/>
+          <ac:spMkLst>
+            <pc:docMk/>
+            <pc:sldMk cId="2241053905" sldId="263"/>
+            <ac:spMk id="4" creationId="{D47AB2CB-4503-2DBF-0E54-6D6C978871D2}"/>
+          </ac:spMkLst>
+        </pc:spChg>
+        <pc:spChg chg="add mod">
+          <ac:chgData name="Tristan Kindle" userId="725f9a46e00a5a01" providerId="LiveId" clId="{7AEAA6BC-FB2E-4615-8233-0F5941A47490}" dt="2023-04-02T10:44:40.568" v="505" actId="1076"/>
+          <ac:spMkLst>
+            <pc:docMk/>
+            <pc:sldMk cId="2241053905" sldId="263"/>
+            <ac:spMk id="5" creationId="{A48298B4-AC74-8A39-5148-8C294B73F990}"/>
+          </ac:spMkLst>
+        </pc:spChg>
+        <pc:spChg chg="add mod">
+          <ac:chgData name="Tristan Kindle" userId="725f9a46e00a5a01" providerId="LiveId" clId="{7AEAA6BC-FB2E-4615-8233-0F5941A47490}" dt="2023-04-02T10:44:07.228" v="491" actId="1076"/>
+          <ac:spMkLst>
+            <pc:docMk/>
+            <pc:sldMk cId="2241053905" sldId="263"/>
+            <ac:spMk id="6" creationId="{EEA893F1-6C61-D43A-B7B0-A710059C925C}"/>
+          </ac:spMkLst>
+        </pc:spChg>
+        <pc:spChg chg="add mod">
+          <ac:chgData name="Tristan Kindle" userId="725f9a46e00a5a01" providerId="LiveId" clId="{7AEAA6BC-FB2E-4615-8233-0F5941A47490}" dt="2023-04-02T10:44:24.168" v="497" actId="14100"/>
+          <ac:spMkLst>
+            <pc:docMk/>
+            <pc:sldMk cId="2241053905" sldId="263"/>
+            <ac:spMk id="8" creationId="{E9825C42-6FE1-ACC3-8200-D3C18560F5BB}"/>
+          </ac:spMkLst>
+        </pc:spChg>
+        <pc:spChg chg="add mod">
+          <ac:chgData name="Tristan Kindle" userId="725f9a46e00a5a01" providerId="LiveId" clId="{7AEAA6BC-FB2E-4615-8233-0F5941A47490}" dt="2023-04-02T10:45:03.107" v="513" actId="20577"/>
+          <ac:spMkLst>
+            <pc:docMk/>
+            <pc:sldMk cId="2241053905" sldId="263"/>
+            <ac:spMk id="12" creationId="{A540E74B-77B0-CA9F-3C28-9B336B5F0036}"/>
+          </ac:spMkLst>
+        </pc:spChg>
+        <pc:spChg chg="add mod">
+          <ac:chgData name="Tristan Kindle" userId="725f9a46e00a5a01" providerId="LiveId" clId="{7AEAA6BC-FB2E-4615-8233-0F5941A47490}" dt="2023-04-02T10:45:34.323" v="612" actId="20577"/>
+          <ac:spMkLst>
+            <pc:docMk/>
+            <pc:sldMk cId="2241053905" sldId="263"/>
+            <ac:spMk id="13" creationId="{A8F0F9F7-54DB-EBEE-3348-C141A0CBEC60}"/>
+          </ac:spMkLst>
+        </pc:spChg>
+        <pc:spChg chg="del">
+          <ac:chgData name="Tristan Kindle" userId="725f9a46e00a5a01" providerId="LiveId" clId="{7AEAA6BC-FB2E-4615-8233-0F5941A47490}" dt="2023-04-02T10:40:54.708" v="323" actId="478"/>
+          <ac:spMkLst>
+            <pc:docMk/>
+            <pc:sldMk cId="2241053905" sldId="263"/>
+            <ac:spMk id="15" creationId="{60D202F3-31F8-0FE6-106D-CE5543BA88AD}"/>
+          </ac:spMkLst>
+        </pc:spChg>
+        <pc:spChg chg="del">
+          <ac:chgData name="Tristan Kindle" userId="725f9a46e00a5a01" providerId="LiveId" clId="{7AEAA6BC-FB2E-4615-8233-0F5941A47490}" dt="2023-04-02T10:40:54.708" v="323" actId="478"/>
+          <ac:spMkLst>
+            <pc:docMk/>
+            <pc:sldMk cId="2241053905" sldId="263"/>
+            <ac:spMk id="17" creationId="{81A7794A-58D1-9DD6-78EB-E52BD6899D15}"/>
+          </ac:spMkLst>
+        </pc:spChg>
+        <pc:picChg chg="add mod">
+          <ac:chgData name="Tristan Kindle" userId="725f9a46e00a5a01" providerId="LiveId" clId="{7AEAA6BC-FB2E-4615-8233-0F5941A47490}" dt="2023-04-02T10:44:29.600" v="498" actId="1076"/>
+          <ac:picMkLst>
+            <pc:docMk/>
+            <pc:sldMk cId="2241053905" sldId="263"/>
+            <ac:picMk id="3" creationId="{46E9B3A1-BE5A-E160-3F34-22C5063C305A}"/>
+          </ac:picMkLst>
+        </pc:picChg>
+        <pc:picChg chg="del">
+          <ac:chgData name="Tristan Kindle" userId="725f9a46e00a5a01" providerId="LiveId" clId="{7AEAA6BC-FB2E-4615-8233-0F5941A47490}" dt="2023-04-02T10:40:55.235" v="324" actId="478"/>
+          <ac:picMkLst>
+            <pc:docMk/>
+            <pc:sldMk cId="2241053905" sldId="263"/>
+            <ac:picMk id="7" creationId="{168A16D3-9FBF-3132-971C-8D75FDF1D61B}"/>
+          </ac:picMkLst>
+        </pc:picChg>
+        <pc:picChg chg="del">
+          <ac:chgData name="Tristan Kindle" userId="725f9a46e00a5a01" providerId="LiveId" clId="{7AEAA6BC-FB2E-4615-8233-0F5941A47490}" dt="2023-04-02T10:40:54.708" v="323" actId="478"/>
+          <ac:picMkLst>
+            <pc:docMk/>
+            <pc:sldMk cId="2241053905" sldId="263"/>
+            <ac:picMk id="11" creationId="{0A8101AC-E979-5460-87B7-A12425562F41}"/>
+          </ac:picMkLst>
+        </pc:picChg>
+        <pc:picChg chg="mod">
+          <ac:chgData name="Tristan Kindle" userId="725f9a46e00a5a01" providerId="LiveId" clId="{7AEAA6BC-FB2E-4615-8233-0F5941A47490}" dt="2023-04-02T10:44:03.861" v="490" actId="1076"/>
+          <ac:picMkLst>
+            <pc:docMk/>
+            <pc:sldMk cId="2241053905" sldId="263"/>
+            <ac:picMk id="18" creationId="{A7D45A6C-38DD-D8D3-0F09-3664A204B36B}"/>
+          </ac:picMkLst>
+        </pc:picChg>
+        <pc:cxnChg chg="add">
+          <ac:chgData name="Tristan Kindle" userId="725f9a46e00a5a01" providerId="LiveId" clId="{7AEAA6BC-FB2E-4615-8233-0F5941A47490}" dt="2023-04-02T10:44:51.946" v="506" actId="11529"/>
+          <ac:cxnSpMkLst>
+            <pc:docMk/>
+            <pc:sldMk cId="2241053905" sldId="263"/>
+            <ac:cxnSpMk id="10" creationId="{CEC2C4C6-219F-6174-E577-13CDC794D27C}"/>
+          </ac:cxnSpMkLst>
+        </pc:cxnChg>
+        <pc:cxnChg chg="add del mod">
+          <ac:chgData name="Tristan Kindle" userId="725f9a46e00a5a01" providerId="LiveId" clId="{7AEAA6BC-FB2E-4615-8233-0F5941A47490}" dt="2023-04-02T10:45:01.195" v="509" actId="478"/>
+          <ac:cxnSpMkLst>
+            <pc:docMk/>
+            <pc:sldMk cId="2241053905" sldId="263"/>
+            <ac:cxnSpMk id="14" creationId="{76124767-E2E9-9D1A-98CA-55E0461AB3C6}"/>
+          </ac:cxnSpMkLst>
+        </pc:cxnChg>
+      </pc:sldChg>
+    </pc:docChg>
+  </pc:docChgLst>
+</pc:chgInfo>
 </file>
 
 <file path=ppt/ink/ink1.xml><?xml version="1.0" encoding="utf-8"?>
@@ -287,7 +962,7 @@
           <a:p>
             <a:fld id="{D638DB36-9BE9-D944-B3BF-629E95F11494}" type="datetimeFigureOut">
               <a:rPr lang="en-CH" smtClean="0"/>
-              <a:t>24.03.23</a:t>
+              <a:t>02/04/2023</a:t>
             </a:fld>
             <a:endParaRPr lang="en-CH"/>
           </a:p>
@@ -341,7 +1016,7 @@
           <a:p>
             <a:fld id="{6DFD2B62-BD57-6E49-9768-C5608A4C967D}" type="slidenum">
               <a:rPr lang="en-CH" smtClean="0"/>
-              <a:t>‹#›</a:t>
+              <a:t>‹Nr.›</a:t>
             </a:fld>
             <a:endParaRPr lang="en-CH"/>
           </a:p>
@@ -487,7 +1162,7 @@
           <a:p>
             <a:fld id="{D638DB36-9BE9-D944-B3BF-629E95F11494}" type="datetimeFigureOut">
               <a:rPr lang="en-CH" smtClean="0"/>
-              <a:t>24.03.23</a:t>
+              <a:t>02/04/2023</a:t>
             </a:fld>
             <a:endParaRPr lang="en-CH"/>
           </a:p>
@@ -541,7 +1216,7 @@
           <a:p>
             <a:fld id="{6DFD2B62-BD57-6E49-9768-C5608A4C967D}" type="slidenum">
               <a:rPr lang="en-CH" smtClean="0"/>
-              <a:t>‹#›</a:t>
+              <a:t>‹Nr.›</a:t>
             </a:fld>
             <a:endParaRPr lang="en-CH"/>
           </a:p>
@@ -697,7 +1372,7 @@
           <a:p>
             <a:fld id="{D638DB36-9BE9-D944-B3BF-629E95F11494}" type="datetimeFigureOut">
               <a:rPr lang="en-CH" smtClean="0"/>
-              <a:t>24.03.23</a:t>
+              <a:t>02/04/2023</a:t>
             </a:fld>
             <a:endParaRPr lang="en-CH"/>
           </a:p>
@@ -751,7 +1426,7 @@
           <a:p>
             <a:fld id="{6DFD2B62-BD57-6E49-9768-C5608A4C967D}" type="slidenum">
               <a:rPr lang="en-CH" smtClean="0"/>
-              <a:t>‹#›</a:t>
+              <a:t>‹Nr.›</a:t>
             </a:fld>
             <a:endParaRPr lang="en-CH"/>
           </a:p>
@@ -897,7 +1572,7 @@
           <a:p>
             <a:fld id="{D638DB36-9BE9-D944-B3BF-629E95F11494}" type="datetimeFigureOut">
               <a:rPr lang="en-CH" smtClean="0"/>
-              <a:t>24.03.23</a:t>
+              <a:t>02/04/2023</a:t>
             </a:fld>
             <a:endParaRPr lang="en-CH"/>
           </a:p>
@@ -951,7 +1626,7 @@
           <a:p>
             <a:fld id="{6DFD2B62-BD57-6E49-9768-C5608A4C967D}" type="slidenum">
               <a:rPr lang="en-CH" smtClean="0"/>
-              <a:t>‹#›</a:t>
+              <a:t>‹Nr.›</a:t>
             </a:fld>
             <a:endParaRPr lang="en-CH"/>
           </a:p>
@@ -1173,7 +1848,7 @@
           <a:p>
             <a:fld id="{D638DB36-9BE9-D944-B3BF-629E95F11494}" type="datetimeFigureOut">
               <a:rPr lang="en-CH" smtClean="0"/>
-              <a:t>24.03.23</a:t>
+              <a:t>02/04/2023</a:t>
             </a:fld>
             <a:endParaRPr lang="en-CH"/>
           </a:p>
@@ -1227,7 +1902,7 @@
           <a:p>
             <a:fld id="{6DFD2B62-BD57-6E49-9768-C5608A4C967D}" type="slidenum">
               <a:rPr lang="en-CH" smtClean="0"/>
-              <a:t>‹#›</a:t>
+              <a:t>‹Nr.›</a:t>
             </a:fld>
             <a:endParaRPr lang="en-CH"/>
           </a:p>
@@ -1441,7 +2116,7 @@
           <a:p>
             <a:fld id="{D638DB36-9BE9-D944-B3BF-629E95F11494}" type="datetimeFigureOut">
               <a:rPr lang="en-CH" smtClean="0"/>
-              <a:t>24.03.23</a:t>
+              <a:t>02/04/2023</a:t>
             </a:fld>
             <a:endParaRPr lang="en-CH"/>
           </a:p>
@@ -1495,7 +2170,7 @@
           <a:p>
             <a:fld id="{6DFD2B62-BD57-6E49-9768-C5608A4C967D}" type="slidenum">
               <a:rPr lang="en-CH" smtClean="0"/>
-              <a:t>‹#›</a:t>
+              <a:t>‹Nr.›</a:t>
             </a:fld>
             <a:endParaRPr lang="en-CH"/>
           </a:p>
@@ -1856,7 +2531,7 @@
           <a:p>
             <a:fld id="{D638DB36-9BE9-D944-B3BF-629E95F11494}" type="datetimeFigureOut">
               <a:rPr lang="en-CH" smtClean="0"/>
-              <a:t>24.03.23</a:t>
+              <a:t>02/04/2023</a:t>
             </a:fld>
             <a:endParaRPr lang="en-CH"/>
           </a:p>
@@ -1910,7 +2585,7 @@
           <a:p>
             <a:fld id="{6DFD2B62-BD57-6E49-9768-C5608A4C967D}" type="slidenum">
               <a:rPr lang="en-CH" smtClean="0"/>
-              <a:t>‹#›</a:t>
+              <a:t>‹Nr.›</a:t>
             </a:fld>
             <a:endParaRPr lang="en-CH"/>
           </a:p>
@@ -1998,7 +2673,7 @@
           <a:p>
             <a:fld id="{D638DB36-9BE9-D944-B3BF-629E95F11494}" type="datetimeFigureOut">
               <a:rPr lang="en-CH" smtClean="0"/>
-              <a:t>24.03.23</a:t>
+              <a:t>02/04/2023</a:t>
             </a:fld>
             <a:endParaRPr lang="en-CH"/>
           </a:p>
@@ -2052,7 +2727,7 @@
           <a:p>
             <a:fld id="{6DFD2B62-BD57-6E49-9768-C5608A4C967D}" type="slidenum">
               <a:rPr lang="en-CH" smtClean="0"/>
-              <a:t>‹#›</a:t>
+              <a:t>‹Nr.›</a:t>
             </a:fld>
             <a:endParaRPr lang="en-CH"/>
           </a:p>
@@ -2111,7 +2786,7 @@
           <a:p>
             <a:fld id="{D638DB36-9BE9-D944-B3BF-629E95F11494}" type="datetimeFigureOut">
               <a:rPr lang="en-CH" smtClean="0"/>
-              <a:t>24.03.23</a:t>
+              <a:t>02/04/2023</a:t>
             </a:fld>
             <a:endParaRPr lang="en-CH"/>
           </a:p>
@@ -2165,7 +2840,7 @@
           <a:p>
             <a:fld id="{6DFD2B62-BD57-6E49-9768-C5608A4C967D}" type="slidenum">
               <a:rPr lang="en-CH" smtClean="0"/>
-              <a:t>‹#›</a:t>
+              <a:t>‹Nr.›</a:t>
             </a:fld>
             <a:endParaRPr lang="en-CH"/>
           </a:p>
@@ -2424,7 +3099,7 @@
           <a:p>
             <a:fld id="{D638DB36-9BE9-D944-B3BF-629E95F11494}" type="datetimeFigureOut">
               <a:rPr lang="en-CH" smtClean="0"/>
-              <a:t>24.03.23</a:t>
+              <a:t>02/04/2023</a:t>
             </a:fld>
             <a:endParaRPr lang="en-CH"/>
           </a:p>
@@ -2478,7 +3153,7 @@
           <a:p>
             <a:fld id="{6DFD2B62-BD57-6E49-9768-C5608A4C967D}" type="slidenum">
               <a:rPr lang="en-CH" smtClean="0"/>
-              <a:t>‹#›</a:t>
+              <a:t>‹Nr.›</a:t>
             </a:fld>
             <a:endParaRPr lang="en-CH"/>
           </a:p>
@@ -2713,7 +3388,7 @@
           <a:p>
             <a:fld id="{D638DB36-9BE9-D944-B3BF-629E95F11494}" type="datetimeFigureOut">
               <a:rPr lang="en-CH" smtClean="0"/>
-              <a:t>24.03.23</a:t>
+              <a:t>02/04/2023</a:t>
             </a:fld>
             <a:endParaRPr lang="en-CH"/>
           </a:p>
@@ -2767,7 +3442,7 @@
           <a:p>
             <a:fld id="{6DFD2B62-BD57-6E49-9768-C5608A4C967D}" type="slidenum">
               <a:rPr lang="en-CH" smtClean="0"/>
-              <a:t>‹#›</a:t>
+              <a:t>‹Nr.›</a:t>
             </a:fld>
             <a:endParaRPr lang="en-CH"/>
           </a:p>
@@ -2956,7 +3631,7 @@
           <a:p>
             <a:fld id="{D638DB36-9BE9-D944-B3BF-629E95F11494}" type="datetimeFigureOut">
               <a:rPr lang="en-CH" smtClean="0"/>
-              <a:t>24.03.23</a:t>
+              <a:t>02/04/2023</a:t>
             </a:fld>
             <a:endParaRPr lang="en-CH"/>
           </a:p>
@@ -3046,7 +3721,7 @@
           <a:p>
             <a:fld id="{6DFD2B62-BD57-6E49-9768-C5608A4C967D}" type="slidenum">
               <a:rPr lang="en-CH" smtClean="0"/>
-              <a:t>‹#›</a:t>
+              <a:t>‹Nr.›</a:t>
             </a:fld>
             <a:endParaRPr lang="en-CH"/>
           </a:p>
@@ -3373,8 +4048,8 @@
           <a:chExt cx="0" cy="0"/>
         </a:xfrm>
       </p:grpSpPr>
-      <mc:AlternateContent xmlns:mc="http://schemas.openxmlformats.org/markup-compatibility/2006">
-        <mc:Choice xmlns:p14="http://schemas.microsoft.com/office/powerpoint/2010/main" Requires="p14">
+      <mc:AlternateContent xmlns:mc="http://schemas.openxmlformats.org/markup-compatibility/2006" xmlns:p14="http://schemas.microsoft.com/office/powerpoint/2010/main">
+        <mc:Choice Requires="p14">
           <p:contentPart p14:bwMode="auto" r:id="rId2">
             <p14:nvContentPartPr>
               <p14:cNvPr id="6" name="Ink 5">
@@ -3393,7 +4068,7 @@
             </p14:xfrm>
           </p:contentPart>
         </mc:Choice>
-        <mc:Fallback>
+        <mc:Fallback xmlns="">
           <p:pic>
             <p:nvPicPr>
               <p:cNvPr id="6" name="Ink 5">
@@ -5007,6 +5682,2131 @@
     <p:extLst>
       <p:ext uri="{BB962C8B-B14F-4D97-AF65-F5344CB8AC3E}">
         <p14:creationId xmlns:p14="http://schemas.microsoft.com/office/powerpoint/2010/main" val="2484687227"/>
+      </p:ext>
+    </p:extLst>
+  </p:cSld>
+  <p:clrMapOvr>
+    <a:masterClrMapping/>
+  </p:clrMapOvr>
+</p:sld>
+</file>
+
+<file path=ppt/slides/slide5.xml><?xml version="1.0" encoding="utf-8"?>
+<p:sld xmlns:a="http://schemas.openxmlformats.org/drawingml/2006/main" xmlns:r="http://schemas.openxmlformats.org/officeDocument/2006/relationships" xmlns:p="http://schemas.openxmlformats.org/presentationml/2006/main">
+  <p:cSld>
+    <p:spTree>
+      <p:nvGrpSpPr>
+        <p:cNvPr id="1" name=""/>
+        <p:cNvGrpSpPr/>
+        <p:nvPr/>
+      </p:nvGrpSpPr>
+      <p:grpSpPr>
+        <a:xfrm>
+          <a:off x="0" y="0"/>
+          <a:ext cx="0" cy="0"/>
+          <a:chOff x="0" y="0"/>
+          <a:chExt cx="0" cy="0"/>
+        </a:xfrm>
+      </p:grpSpPr>
+      <p:sp>
+        <p:nvSpPr>
+          <p:cNvPr id="21" name="Oval 20">
+            <a:extLst>
+              <a:ext uri="{FF2B5EF4-FFF2-40B4-BE49-F238E27FC236}">
+                <a16:creationId xmlns:a16="http://schemas.microsoft.com/office/drawing/2014/main" id="{56E18752-6B2C-1838-E1C5-26A37A501450}"/>
+              </a:ext>
+            </a:extLst>
+          </p:cNvPr>
+          <p:cNvSpPr/>
+          <p:nvPr/>
+        </p:nvSpPr>
+        <p:spPr>
+          <a:xfrm>
+            <a:off x="4068706" y="2099697"/>
+            <a:ext cx="3419489" cy="3106545"/>
+          </a:xfrm>
+          <a:prstGeom prst="ellipse">
+            <a:avLst/>
+          </a:prstGeom>
+          <a:solidFill>
+            <a:schemeClr val="accent6">
+              <a:lumMod val="20000"/>
+              <a:lumOff val="80000"/>
+            </a:schemeClr>
+          </a:solidFill>
+          <a:ln>
+            <a:noFill/>
+          </a:ln>
+        </p:spPr>
+        <p:style>
+          <a:lnRef idx="2">
+            <a:schemeClr val="accent1">
+              <a:shade val="50000"/>
+            </a:schemeClr>
+          </a:lnRef>
+          <a:fillRef idx="1">
+            <a:schemeClr val="accent1"/>
+          </a:fillRef>
+          <a:effectRef idx="0">
+            <a:schemeClr val="accent1"/>
+          </a:effectRef>
+          <a:fontRef idx="minor">
+            <a:schemeClr val="lt1"/>
+          </a:fontRef>
+        </p:style>
+        <p:txBody>
+          <a:bodyPr rtlCol="0" anchor="ctr"/>
+          <a:lstStyle/>
+          <a:p>
+            <a:pPr algn="ctr"/>
+            <a:endParaRPr lang="en-CH"/>
+          </a:p>
+        </p:txBody>
+      </p:sp>
+      <p:pic>
+        <p:nvPicPr>
+          <p:cNvPr id="8" name="Graphic 7" descr="Director's Chair outline">
+            <a:extLst>
+              <a:ext uri="{FF2B5EF4-FFF2-40B4-BE49-F238E27FC236}">
+                <a16:creationId xmlns:a16="http://schemas.microsoft.com/office/drawing/2014/main" id="{21FF6093-2786-5D7C-707F-3229D60442B1}"/>
+              </a:ext>
+            </a:extLst>
+          </p:cNvPr>
+          <p:cNvPicPr>
+            <a:picLocks noChangeAspect="1"/>
+          </p:cNvPicPr>
+          <p:nvPr/>
+        </p:nvPicPr>
+        <p:blipFill>
+          <a:blip r:embed="rId2">
+            <a:extLst>
+              <a:ext uri="{96DAC541-7B7A-43D3-8B79-37D633B846F1}">
+                <asvg:svgBlip xmlns:asvg="http://schemas.microsoft.com/office/drawing/2016/SVG/main" r:embed="rId3"/>
+              </a:ext>
+            </a:extLst>
+          </a:blip>
+          <a:stretch>
+            <a:fillRect/>
+          </a:stretch>
+        </p:blipFill>
+        <p:spPr>
+          <a:xfrm>
+            <a:off x="4632894" y="2590479"/>
+            <a:ext cx="2273300" cy="2273300"/>
+          </a:xfrm>
+          <a:prstGeom prst="rect">
+            <a:avLst/>
+          </a:prstGeom>
+        </p:spPr>
+      </p:pic>
+      <p:sp>
+        <p:nvSpPr>
+          <p:cNvPr id="9" name="TextBox 8">
+            <a:extLst>
+              <a:ext uri="{FF2B5EF4-FFF2-40B4-BE49-F238E27FC236}">
+                <a16:creationId xmlns:a16="http://schemas.microsoft.com/office/drawing/2014/main" id="{F7B74170-B682-A4DE-8CA6-8C4D76020310}"/>
+              </a:ext>
+            </a:extLst>
+          </p:cNvPr>
+          <p:cNvSpPr txBox="1"/>
+          <p:nvPr/>
+        </p:nvSpPr>
+        <p:spPr>
+          <a:xfrm>
+            <a:off x="5063664" y="2874686"/>
+            <a:ext cx="1461188" cy="400110"/>
+          </a:xfrm>
+          <a:prstGeom prst="rect">
+            <a:avLst/>
+          </a:prstGeom>
+          <a:noFill/>
+        </p:spPr>
+        <p:txBody>
+          <a:bodyPr wrap="square" rtlCol="0">
+            <a:spAutoFit/>
+          </a:bodyPr>
+          <a:lstStyle/>
+          <a:p>
+            <a:pPr algn="ctr"/>
+            <a:r>
+              <a:rPr lang="en-CH" sz="2000" dirty="0">
+                <a:solidFill>
+                  <a:schemeClr val="tx1">
+                    <a:lumMod val="75000"/>
+                    <a:lumOff val="25000"/>
+                  </a:schemeClr>
+                </a:solidFill>
+                <a:latin typeface="Andale Mono" panose="020B0509000000000004" pitchFamily="49" charset="0"/>
+                <a:cs typeface="AkayaKanadaka" panose="02010502080401010103" pitchFamily="2" charset="77"/>
+              </a:rPr>
+              <a:t>BIMDb</a:t>
+            </a:r>
+          </a:p>
+        </p:txBody>
+      </p:sp>
+      <p:pic>
+        <p:nvPicPr>
+          <p:cNvPr id="5" name="Graphic 4" descr="Connections outline">
+            <a:extLst>
+              <a:ext uri="{FF2B5EF4-FFF2-40B4-BE49-F238E27FC236}">
+                <a16:creationId xmlns:a16="http://schemas.microsoft.com/office/drawing/2014/main" id="{92B0EB9C-1D5D-AD7E-11FC-C9C1F25D5816}"/>
+              </a:ext>
+            </a:extLst>
+          </p:cNvPr>
+          <p:cNvPicPr>
+            <a:picLocks noChangeAspect="1"/>
+          </p:cNvPicPr>
+          <p:nvPr/>
+        </p:nvPicPr>
+        <p:blipFill>
+          <a:blip r:embed="rId4">
+            <a:extLst>
+              <a:ext uri="{96DAC541-7B7A-43D3-8B79-37D633B846F1}">
+                <asvg:svgBlip xmlns:asvg="http://schemas.microsoft.com/office/drawing/2016/SVG/main" r:embed="rId5"/>
+              </a:ext>
+            </a:extLst>
+          </a:blip>
+          <a:stretch>
+            <a:fillRect/>
+          </a:stretch>
+        </p:blipFill>
+        <p:spPr>
+          <a:xfrm>
+            <a:off x="508940" y="2790357"/>
+            <a:ext cx="1563131" cy="1563131"/>
+          </a:xfrm>
+          <a:prstGeom prst="rect">
+            <a:avLst/>
+          </a:prstGeom>
+        </p:spPr>
+      </p:pic>
+      <p:pic>
+        <p:nvPicPr>
+          <p:cNvPr id="10" name="Graphic 9" descr="Left Brain outline">
+            <a:extLst>
+              <a:ext uri="{FF2B5EF4-FFF2-40B4-BE49-F238E27FC236}">
+                <a16:creationId xmlns:a16="http://schemas.microsoft.com/office/drawing/2014/main" id="{CE49BD2A-B1B3-7286-99DC-D29CEF6E5E46}"/>
+              </a:ext>
+            </a:extLst>
+          </p:cNvPr>
+          <p:cNvPicPr>
+            <a:picLocks noChangeAspect="1"/>
+          </p:cNvPicPr>
+          <p:nvPr/>
+        </p:nvPicPr>
+        <p:blipFill>
+          <a:blip r:embed="rId6">
+            <a:extLst>
+              <a:ext uri="{96DAC541-7B7A-43D3-8B79-37D633B846F1}">
+                <asvg:svgBlip xmlns:asvg="http://schemas.microsoft.com/office/drawing/2016/SVG/main" r:embed="rId7"/>
+              </a:ext>
+            </a:extLst>
+          </a:blip>
+          <a:stretch>
+            <a:fillRect/>
+          </a:stretch>
+        </p:blipFill>
+        <p:spPr>
+          <a:xfrm>
+            <a:off x="2554303" y="1160697"/>
+            <a:ext cx="1563130" cy="1563130"/>
+          </a:xfrm>
+          <a:prstGeom prst="rect">
+            <a:avLst/>
+          </a:prstGeom>
+        </p:spPr>
+      </p:pic>
+      <p:pic>
+        <p:nvPicPr>
+          <p:cNvPr id="13" name="Graphic 12" descr="Folder Search outline">
+            <a:extLst>
+              <a:ext uri="{FF2B5EF4-FFF2-40B4-BE49-F238E27FC236}">
+                <a16:creationId xmlns:a16="http://schemas.microsoft.com/office/drawing/2014/main" id="{4755FEB8-8C01-93CA-849F-038D33FB3116}"/>
+              </a:ext>
+            </a:extLst>
+          </p:cNvPr>
+          <p:cNvPicPr>
+            <a:picLocks noChangeAspect="1"/>
+          </p:cNvPicPr>
+          <p:nvPr/>
+        </p:nvPicPr>
+        <p:blipFill>
+          <a:blip r:embed="rId8">
+            <a:extLst>
+              <a:ext uri="{96DAC541-7B7A-43D3-8B79-37D633B846F1}">
+                <asvg:svgBlip xmlns:asvg="http://schemas.microsoft.com/office/drawing/2016/SVG/main" r:embed="rId9"/>
+              </a:ext>
+            </a:extLst>
+          </a:blip>
+          <a:stretch>
+            <a:fillRect/>
+          </a:stretch>
+        </p:blipFill>
+        <p:spPr>
+          <a:xfrm>
+            <a:off x="7592679" y="1425158"/>
+            <a:ext cx="1563130" cy="1563130"/>
+          </a:xfrm>
+          <a:prstGeom prst="rect">
+            <a:avLst/>
+          </a:prstGeom>
+        </p:spPr>
+      </p:pic>
+      <p:pic>
+        <p:nvPicPr>
+          <p:cNvPr id="15" name="Graphic 14" descr="Rating outline">
+            <a:extLst>
+              <a:ext uri="{FF2B5EF4-FFF2-40B4-BE49-F238E27FC236}">
+                <a16:creationId xmlns:a16="http://schemas.microsoft.com/office/drawing/2014/main" id="{BCE2EA1A-54B0-09CE-0725-EE8ABD5278D9}"/>
+              </a:ext>
+            </a:extLst>
+          </p:cNvPr>
+          <p:cNvPicPr>
+            <a:picLocks noChangeAspect="1"/>
+          </p:cNvPicPr>
+          <p:nvPr/>
+        </p:nvPicPr>
+        <p:blipFill>
+          <a:blip r:embed="rId10">
+            <a:extLst>
+              <a:ext uri="{96DAC541-7B7A-43D3-8B79-37D633B846F1}">
+                <asvg:svgBlip xmlns:asvg="http://schemas.microsoft.com/office/drawing/2016/SVG/main" r:embed="rId11"/>
+              </a:ext>
+            </a:extLst>
+          </a:blip>
+          <a:stretch>
+            <a:fillRect/>
+          </a:stretch>
+        </p:blipFill>
+        <p:spPr>
+          <a:xfrm>
+            <a:off x="9598599" y="2874686"/>
+            <a:ext cx="1413569" cy="1413569"/>
+          </a:xfrm>
+          <a:prstGeom prst="rect">
+            <a:avLst/>
+          </a:prstGeom>
+        </p:spPr>
+      </p:pic>
+      <p:sp>
+        <p:nvSpPr>
+          <p:cNvPr id="2" name="TextBox 1">
+            <a:extLst>
+              <a:ext uri="{FF2B5EF4-FFF2-40B4-BE49-F238E27FC236}">
+                <a16:creationId xmlns:a16="http://schemas.microsoft.com/office/drawing/2014/main" id="{FDAA2EFA-E7BF-4AE3-E489-AA7AD4C571B8}"/>
+              </a:ext>
+            </a:extLst>
+          </p:cNvPr>
+          <p:cNvSpPr txBox="1"/>
+          <p:nvPr/>
+        </p:nvSpPr>
+        <p:spPr>
+          <a:xfrm>
+            <a:off x="10766312" y="3148345"/>
+            <a:ext cx="901262" cy="646331"/>
+          </a:xfrm>
+          <a:prstGeom prst="rect">
+            <a:avLst/>
+          </a:prstGeom>
+          <a:noFill/>
+        </p:spPr>
+        <p:txBody>
+          <a:bodyPr wrap="square" rtlCol="0">
+            <a:spAutoFit/>
+          </a:bodyPr>
+          <a:lstStyle/>
+          <a:p>
+            <a:r>
+              <a:rPr lang="en-GB" dirty="0">
+                <a:solidFill>
+                  <a:schemeClr val="accent6"/>
+                </a:solidFill>
+              </a:rPr>
+              <a:t>social sharing</a:t>
+            </a:r>
+            <a:endParaRPr lang="en-CH" dirty="0">
+              <a:solidFill>
+                <a:schemeClr val="accent6"/>
+              </a:solidFill>
+            </a:endParaRPr>
+          </a:p>
+        </p:txBody>
+      </p:sp>
+      <p:sp>
+        <p:nvSpPr>
+          <p:cNvPr id="6" name="TextBox 5">
+            <a:extLst>
+              <a:ext uri="{FF2B5EF4-FFF2-40B4-BE49-F238E27FC236}">
+                <a16:creationId xmlns:a16="http://schemas.microsoft.com/office/drawing/2014/main" id="{E9FDC607-A21E-0365-3867-7653A414059A}"/>
+              </a:ext>
+            </a:extLst>
+          </p:cNvPr>
+          <p:cNvSpPr txBox="1"/>
+          <p:nvPr/>
+        </p:nvSpPr>
+        <p:spPr>
+          <a:xfrm>
+            <a:off x="997424" y="3984156"/>
+            <a:ext cx="1469673" cy="369332"/>
+          </a:xfrm>
+          <a:prstGeom prst="rect">
+            <a:avLst/>
+          </a:prstGeom>
+          <a:noFill/>
+        </p:spPr>
+        <p:txBody>
+          <a:bodyPr wrap="square" rtlCol="0">
+            <a:spAutoFit/>
+          </a:bodyPr>
+          <a:lstStyle/>
+          <a:p>
+            <a:r>
+              <a:rPr lang="en-GB" dirty="0">
+                <a:solidFill>
+                  <a:schemeClr val="accent6"/>
+                </a:solidFill>
+              </a:rPr>
+              <a:t>watch group</a:t>
+            </a:r>
+            <a:endParaRPr lang="en-CH" dirty="0">
+              <a:solidFill>
+                <a:schemeClr val="accent6"/>
+              </a:solidFill>
+            </a:endParaRPr>
+          </a:p>
+        </p:txBody>
+      </p:sp>
+      <p:sp>
+        <p:nvSpPr>
+          <p:cNvPr id="7" name="TextBox 6">
+            <a:extLst>
+              <a:ext uri="{FF2B5EF4-FFF2-40B4-BE49-F238E27FC236}">
+                <a16:creationId xmlns:a16="http://schemas.microsoft.com/office/drawing/2014/main" id="{8FAE13DB-B562-5D20-405E-AB9B55A8494A}"/>
+              </a:ext>
+            </a:extLst>
+          </p:cNvPr>
+          <p:cNvSpPr txBox="1"/>
+          <p:nvPr/>
+        </p:nvSpPr>
+        <p:spPr>
+          <a:xfrm>
+            <a:off x="8205119" y="1494859"/>
+            <a:ext cx="1469673" cy="369332"/>
+          </a:xfrm>
+          <a:prstGeom prst="rect">
+            <a:avLst/>
+          </a:prstGeom>
+          <a:noFill/>
+        </p:spPr>
+        <p:txBody>
+          <a:bodyPr wrap="square" rtlCol="0">
+            <a:spAutoFit/>
+          </a:bodyPr>
+          <a:lstStyle/>
+          <a:p>
+            <a:r>
+              <a:rPr lang="en-GB" dirty="0">
+                <a:solidFill>
+                  <a:schemeClr val="accent6"/>
+                </a:solidFill>
+              </a:rPr>
+              <a:t>organize</a:t>
+            </a:r>
+            <a:endParaRPr lang="en-CH" dirty="0">
+              <a:solidFill>
+                <a:schemeClr val="accent6"/>
+              </a:solidFill>
+            </a:endParaRPr>
+          </a:p>
+        </p:txBody>
+      </p:sp>
+      <p:sp>
+        <p:nvSpPr>
+          <p:cNvPr id="11" name="TextBox 10">
+            <a:extLst>
+              <a:ext uri="{FF2B5EF4-FFF2-40B4-BE49-F238E27FC236}">
+                <a16:creationId xmlns:a16="http://schemas.microsoft.com/office/drawing/2014/main" id="{EF2C0E13-220A-1025-3C11-1EC5709FBBB9}"/>
+              </a:ext>
+            </a:extLst>
+          </p:cNvPr>
+          <p:cNvSpPr txBox="1"/>
+          <p:nvPr/>
+        </p:nvSpPr>
+        <p:spPr>
+          <a:xfrm>
+            <a:off x="2745382" y="2460647"/>
+            <a:ext cx="1469673" cy="369332"/>
+          </a:xfrm>
+          <a:prstGeom prst="rect">
+            <a:avLst/>
+          </a:prstGeom>
+          <a:noFill/>
+        </p:spPr>
+        <p:txBody>
+          <a:bodyPr wrap="square" rtlCol="0">
+            <a:spAutoFit/>
+          </a:bodyPr>
+          <a:lstStyle/>
+          <a:p>
+            <a:r>
+              <a:rPr lang="en-GB" dirty="0">
+                <a:solidFill>
+                  <a:schemeClr val="accent6"/>
+                </a:solidFill>
+              </a:rPr>
+              <a:t>customize</a:t>
+            </a:r>
+            <a:endParaRPr lang="en-CH" dirty="0">
+              <a:solidFill>
+                <a:schemeClr val="accent6"/>
+              </a:solidFill>
+            </a:endParaRPr>
+          </a:p>
+        </p:txBody>
+      </p:sp>
+      <p:pic>
+        <p:nvPicPr>
+          <p:cNvPr id="16" name="Graphic 15" descr="Thumbs up sign outline">
+            <a:extLst>
+              <a:ext uri="{FF2B5EF4-FFF2-40B4-BE49-F238E27FC236}">
+                <a16:creationId xmlns:a16="http://schemas.microsoft.com/office/drawing/2014/main" id="{7260DE25-F326-9D69-E8FC-534071C44E49}"/>
+              </a:ext>
+            </a:extLst>
+          </p:cNvPr>
+          <p:cNvPicPr>
+            <a:picLocks noChangeAspect="1"/>
+          </p:cNvPicPr>
+          <p:nvPr/>
+        </p:nvPicPr>
+        <p:blipFill>
+          <a:blip r:embed="rId12">
+            <a:extLst>
+              <a:ext uri="{96DAC541-7B7A-43D3-8B79-37D633B846F1}">
+                <asvg:svgBlip xmlns:asvg="http://schemas.microsoft.com/office/drawing/2016/SVG/main" r:embed="rId13"/>
+              </a:ext>
+            </a:extLst>
+          </a:blip>
+          <a:stretch>
+            <a:fillRect/>
+          </a:stretch>
+        </p:blipFill>
+        <p:spPr>
+          <a:xfrm>
+            <a:off x="2490979" y="3909651"/>
+            <a:ext cx="1296591" cy="1296591"/>
+          </a:xfrm>
+          <a:prstGeom prst="rect">
+            <a:avLst/>
+          </a:prstGeom>
+        </p:spPr>
+      </p:pic>
+      <p:sp>
+        <p:nvSpPr>
+          <p:cNvPr id="17" name="TextBox 16">
+            <a:extLst>
+              <a:ext uri="{FF2B5EF4-FFF2-40B4-BE49-F238E27FC236}">
+                <a16:creationId xmlns:a16="http://schemas.microsoft.com/office/drawing/2014/main" id="{3EAA8C99-D42E-FADE-E174-B8B6DD8EC026}"/>
+              </a:ext>
+            </a:extLst>
+          </p:cNvPr>
+          <p:cNvSpPr txBox="1"/>
+          <p:nvPr/>
+        </p:nvSpPr>
+        <p:spPr>
+          <a:xfrm>
+            <a:off x="2599727" y="4995622"/>
+            <a:ext cx="2001914" cy="369332"/>
+          </a:xfrm>
+          <a:prstGeom prst="rect">
+            <a:avLst/>
+          </a:prstGeom>
+          <a:noFill/>
+        </p:spPr>
+        <p:txBody>
+          <a:bodyPr wrap="square" rtlCol="0">
+            <a:spAutoFit/>
+          </a:bodyPr>
+          <a:lstStyle/>
+          <a:p>
+            <a:r>
+              <a:rPr lang="en-GB" dirty="0">
+                <a:solidFill>
+                  <a:schemeClr val="accent6"/>
+                </a:solidFill>
+              </a:rPr>
+              <a:t>bias free ratings</a:t>
+            </a:r>
+            <a:endParaRPr lang="en-CH" dirty="0">
+              <a:solidFill>
+                <a:schemeClr val="accent6"/>
+              </a:solidFill>
+            </a:endParaRPr>
+          </a:p>
+        </p:txBody>
+      </p:sp>
+      <p:pic>
+        <p:nvPicPr>
+          <p:cNvPr id="19" name="Graphic 18" descr="Bell outline">
+            <a:extLst>
+              <a:ext uri="{FF2B5EF4-FFF2-40B4-BE49-F238E27FC236}">
+                <a16:creationId xmlns:a16="http://schemas.microsoft.com/office/drawing/2014/main" id="{A958ABB5-D3AC-667F-E669-81381CDEF859}"/>
+              </a:ext>
+            </a:extLst>
+          </p:cNvPr>
+          <p:cNvPicPr>
+            <a:picLocks noChangeAspect="1"/>
+          </p:cNvPicPr>
+          <p:nvPr/>
+        </p:nvPicPr>
+        <p:blipFill>
+          <a:blip r:embed="rId14">
+            <a:extLst>
+              <a:ext uri="{96DAC541-7B7A-43D3-8B79-37D633B846F1}">
+                <asvg:svgBlip xmlns:asvg="http://schemas.microsoft.com/office/drawing/2016/SVG/main" r:embed="rId15"/>
+              </a:ext>
+            </a:extLst>
+          </a:blip>
+          <a:stretch>
+            <a:fillRect/>
+          </a:stretch>
+        </p:blipFill>
+        <p:spPr>
+          <a:xfrm>
+            <a:off x="7815923" y="3764946"/>
+            <a:ext cx="1098833" cy="1098833"/>
+          </a:xfrm>
+          <a:prstGeom prst="rect">
+            <a:avLst/>
+          </a:prstGeom>
+        </p:spPr>
+      </p:pic>
+      <p:sp>
+        <p:nvSpPr>
+          <p:cNvPr id="20" name="TextBox 19">
+            <a:extLst>
+              <a:ext uri="{FF2B5EF4-FFF2-40B4-BE49-F238E27FC236}">
+                <a16:creationId xmlns:a16="http://schemas.microsoft.com/office/drawing/2014/main" id="{9F49B6A4-F26C-9D62-AF96-13AF935534BE}"/>
+              </a:ext>
+            </a:extLst>
+          </p:cNvPr>
+          <p:cNvSpPr txBox="1"/>
+          <p:nvPr/>
+        </p:nvSpPr>
+        <p:spPr>
+          <a:xfrm>
+            <a:off x="7673196" y="4761091"/>
+            <a:ext cx="2992829" cy="369332"/>
+          </a:xfrm>
+          <a:prstGeom prst="rect">
+            <a:avLst/>
+          </a:prstGeom>
+          <a:noFill/>
+        </p:spPr>
+        <p:txBody>
+          <a:bodyPr wrap="square" rtlCol="0">
+            <a:spAutoFit/>
+          </a:bodyPr>
+          <a:lstStyle/>
+          <a:p>
+            <a:r>
+              <a:rPr lang="en-GB">
+                <a:solidFill>
+                  <a:schemeClr val="accent6"/>
+                </a:solidFill>
+              </a:rPr>
+              <a:t>personalized </a:t>
+            </a:r>
+            <a:r>
+              <a:rPr lang="en-GB" dirty="0">
+                <a:solidFill>
+                  <a:schemeClr val="accent6"/>
+                </a:solidFill>
+              </a:rPr>
+              <a:t>notifications</a:t>
+            </a:r>
+            <a:endParaRPr lang="en-CH" dirty="0">
+              <a:solidFill>
+                <a:schemeClr val="accent6"/>
+              </a:solidFill>
+            </a:endParaRPr>
+          </a:p>
+        </p:txBody>
+      </p:sp>
+      <p:pic>
+        <p:nvPicPr>
+          <p:cNvPr id="14" name="Grafik 13">
+            <a:extLst>
+              <a:ext uri="{FF2B5EF4-FFF2-40B4-BE49-F238E27FC236}">
+                <a16:creationId xmlns:a16="http://schemas.microsoft.com/office/drawing/2014/main" id="{EDE40265-8EB4-D083-CB0F-58E5982D611D}"/>
+              </a:ext>
+            </a:extLst>
+          </p:cNvPr>
+          <p:cNvPicPr>
+            <a:picLocks noChangeAspect="1"/>
+          </p:cNvPicPr>
+          <p:nvPr/>
+        </p:nvPicPr>
+        <p:blipFill>
+          <a:blip r:embed="rId16"/>
+          <a:stretch>
+            <a:fillRect/>
+          </a:stretch>
+        </p:blipFill>
+        <p:spPr>
+          <a:xfrm>
+            <a:off x="192780" y="-169529"/>
+            <a:ext cx="11991975" cy="4972050"/>
+          </a:xfrm>
+          <a:prstGeom prst="rect">
+            <a:avLst/>
+          </a:prstGeom>
+        </p:spPr>
+      </p:pic>
+    </p:spTree>
+    <p:extLst>
+      <p:ext uri="{BB962C8B-B14F-4D97-AF65-F5344CB8AC3E}">
+        <p14:creationId xmlns:p14="http://schemas.microsoft.com/office/powerpoint/2010/main" val="1548561688"/>
+      </p:ext>
+    </p:extLst>
+  </p:cSld>
+  <p:clrMapOvr>
+    <a:masterClrMapping/>
+  </p:clrMapOvr>
+</p:sld>
+</file>
+
+<file path=ppt/slides/slide6.xml><?xml version="1.0" encoding="utf-8"?>
+<p:sld xmlns:a="http://schemas.openxmlformats.org/drawingml/2006/main" xmlns:r="http://schemas.openxmlformats.org/officeDocument/2006/relationships" xmlns:p="http://schemas.openxmlformats.org/presentationml/2006/main">
+  <p:cSld>
+    <p:spTree>
+      <p:nvGrpSpPr>
+        <p:cNvPr id="1" name=""/>
+        <p:cNvGrpSpPr/>
+        <p:nvPr/>
+      </p:nvGrpSpPr>
+      <p:grpSpPr>
+        <a:xfrm>
+          <a:off x="0" y="0"/>
+          <a:ext cx="0" cy="0"/>
+          <a:chOff x="0" y="0"/>
+          <a:chExt cx="0" cy="0"/>
+        </a:xfrm>
+      </p:grpSpPr>
+      <p:pic>
+        <p:nvPicPr>
+          <p:cNvPr id="18" name="Grafik 17" descr="Smartphone Silhouette">
+            <a:extLst>
+              <a:ext uri="{FF2B5EF4-FFF2-40B4-BE49-F238E27FC236}">
+                <a16:creationId xmlns:a16="http://schemas.microsoft.com/office/drawing/2014/main" id="{A7D45A6C-38DD-D8D3-0F09-3664A204B36B}"/>
+              </a:ext>
+            </a:extLst>
+          </p:cNvPr>
+          <p:cNvPicPr>
+            <a:picLocks noChangeAspect="1"/>
+          </p:cNvPicPr>
+          <p:nvPr/>
+        </p:nvPicPr>
+        <p:blipFill>
+          <a:blip r:embed="rId2">
+            <a:extLst>
+              <a:ext uri="{96DAC541-7B7A-43D3-8B79-37D633B846F1}">
+                <asvg:svgBlip xmlns:asvg="http://schemas.microsoft.com/office/drawing/2016/SVG/main" r:embed="rId3"/>
+              </a:ext>
+            </a:extLst>
+          </a:blip>
+          <a:stretch>
+            <a:fillRect/>
+          </a:stretch>
+        </p:blipFill>
+        <p:spPr>
+          <a:xfrm>
+            <a:off x="1321443" y="1478666"/>
+            <a:ext cx="4435998" cy="4435998"/>
+          </a:xfrm>
+          <a:prstGeom prst="rect">
+            <a:avLst/>
+          </a:prstGeom>
+        </p:spPr>
+      </p:pic>
+      <p:sp>
+        <p:nvSpPr>
+          <p:cNvPr id="23" name="TextBox 19">
+            <a:extLst>
+              <a:ext uri="{FF2B5EF4-FFF2-40B4-BE49-F238E27FC236}">
+                <a16:creationId xmlns:a16="http://schemas.microsoft.com/office/drawing/2014/main" id="{3AC62F3B-0D44-3AE2-6480-AAFA27EC7650}"/>
+              </a:ext>
+            </a:extLst>
+          </p:cNvPr>
+          <p:cNvSpPr txBox="1"/>
+          <p:nvPr/>
+        </p:nvSpPr>
+        <p:spPr>
+          <a:xfrm>
+            <a:off x="2691208" y="2247637"/>
+            <a:ext cx="1136075" cy="369332"/>
+          </a:xfrm>
+          <a:prstGeom prst="rect">
+            <a:avLst/>
+          </a:prstGeom>
+          <a:noFill/>
+        </p:spPr>
+        <p:txBody>
+          <a:bodyPr wrap="square" rtlCol="0">
+            <a:spAutoFit/>
+          </a:bodyPr>
+          <a:lstStyle/>
+          <a:p>
+            <a:r>
+              <a:rPr lang="en-GB" dirty="0">
+                <a:solidFill>
+                  <a:schemeClr val="accent6"/>
+                </a:solidFill>
+              </a:rPr>
+              <a:t>BIMDb</a:t>
+            </a:r>
+            <a:endParaRPr lang="en-CH" dirty="0">
+              <a:solidFill>
+                <a:schemeClr val="accent6"/>
+              </a:solidFill>
+            </a:endParaRPr>
+          </a:p>
+        </p:txBody>
+      </p:sp>
+      <p:pic>
+        <p:nvPicPr>
+          <p:cNvPr id="25" name="Grafik 24" descr="Rufton mit einfarbiger Füllung">
+            <a:extLst>
+              <a:ext uri="{FF2B5EF4-FFF2-40B4-BE49-F238E27FC236}">
+                <a16:creationId xmlns:a16="http://schemas.microsoft.com/office/drawing/2014/main" id="{D4CC9D33-6BF7-2DAE-B1F5-C9488A5707C5}"/>
+              </a:ext>
+            </a:extLst>
+          </p:cNvPr>
+          <p:cNvPicPr>
+            <a:picLocks noChangeAspect="1"/>
+          </p:cNvPicPr>
+          <p:nvPr/>
+        </p:nvPicPr>
+        <p:blipFill>
+          <a:blip r:embed="rId4">
+            <a:extLst>
+              <a:ext uri="{96DAC541-7B7A-43D3-8B79-37D633B846F1}">
+                <asvg:svgBlip xmlns:asvg="http://schemas.microsoft.com/office/drawing/2016/SVG/main" r:embed="rId5"/>
+              </a:ext>
+            </a:extLst>
+          </a:blip>
+          <a:stretch>
+            <a:fillRect/>
+          </a:stretch>
+        </p:blipFill>
+        <p:spPr>
+          <a:xfrm>
+            <a:off x="4017389" y="2282259"/>
+            <a:ext cx="300087" cy="300087"/>
+          </a:xfrm>
+          <a:prstGeom prst="rect">
+            <a:avLst/>
+          </a:prstGeom>
+        </p:spPr>
+      </p:pic>
+      <p:cxnSp>
+        <p:nvCxnSpPr>
+          <p:cNvPr id="27" name="Gerader Verbinder 26">
+            <a:extLst>
+              <a:ext uri="{FF2B5EF4-FFF2-40B4-BE49-F238E27FC236}">
+                <a16:creationId xmlns:a16="http://schemas.microsoft.com/office/drawing/2014/main" id="{4BAB1880-A23D-7E0D-D8A8-71638D76DBB2}"/>
+              </a:ext>
+            </a:extLst>
+          </p:cNvPr>
+          <p:cNvCxnSpPr/>
+          <p:nvPr/>
+        </p:nvCxnSpPr>
+        <p:spPr>
+          <a:xfrm>
+            <a:off x="2780908" y="2658356"/>
+            <a:ext cx="1555422" cy="0"/>
+          </a:xfrm>
+          <a:prstGeom prst="line">
+            <a:avLst/>
+          </a:prstGeom>
+          <a:ln>
+            <a:solidFill>
+              <a:schemeClr val="tx1">
+                <a:lumMod val="75000"/>
+                <a:lumOff val="25000"/>
+              </a:schemeClr>
+            </a:solidFill>
+          </a:ln>
+        </p:spPr>
+        <p:style>
+          <a:lnRef idx="1">
+            <a:schemeClr val="accent1"/>
+          </a:lnRef>
+          <a:fillRef idx="0">
+            <a:schemeClr val="accent1"/>
+          </a:fillRef>
+          <a:effectRef idx="0">
+            <a:schemeClr val="accent1"/>
+          </a:effectRef>
+          <a:fontRef idx="minor">
+            <a:schemeClr val="tx1"/>
+          </a:fontRef>
+        </p:style>
+      </p:cxnSp>
+      <p:pic>
+        <p:nvPicPr>
+          <p:cNvPr id="29" name="Grafik 28">
+            <a:extLst>
+              <a:ext uri="{FF2B5EF4-FFF2-40B4-BE49-F238E27FC236}">
+                <a16:creationId xmlns:a16="http://schemas.microsoft.com/office/drawing/2014/main" id="{331D34B7-C56C-BD84-5ECC-8373B26BC057}"/>
+              </a:ext>
+            </a:extLst>
+          </p:cNvPr>
+          <p:cNvPicPr>
+            <a:picLocks noChangeAspect="1"/>
+          </p:cNvPicPr>
+          <p:nvPr/>
+        </p:nvPicPr>
+        <p:blipFill>
+          <a:blip r:embed="rId6"/>
+          <a:stretch>
+            <a:fillRect/>
+          </a:stretch>
+        </p:blipFill>
+        <p:spPr>
+          <a:xfrm>
+            <a:off x="2752627" y="2780576"/>
+            <a:ext cx="683198" cy="1057471"/>
+          </a:xfrm>
+          <a:prstGeom prst="rect">
+            <a:avLst/>
+          </a:prstGeom>
+        </p:spPr>
+      </p:pic>
+      <p:sp>
+        <p:nvSpPr>
+          <p:cNvPr id="30" name="TextBox 19">
+            <a:extLst>
+              <a:ext uri="{FF2B5EF4-FFF2-40B4-BE49-F238E27FC236}">
+                <a16:creationId xmlns:a16="http://schemas.microsoft.com/office/drawing/2014/main" id="{DE06A5FD-A4F4-0448-B096-4D34547B85C0}"/>
+              </a:ext>
+            </a:extLst>
+          </p:cNvPr>
+          <p:cNvSpPr txBox="1"/>
+          <p:nvPr/>
+        </p:nvSpPr>
+        <p:spPr>
+          <a:xfrm>
+            <a:off x="2752627" y="3775600"/>
+            <a:ext cx="683198" cy="276999"/>
+          </a:xfrm>
+          <a:prstGeom prst="rect">
+            <a:avLst/>
+          </a:prstGeom>
+          <a:noFill/>
+        </p:spPr>
+        <p:txBody>
+          <a:bodyPr wrap="square" rtlCol="0">
+            <a:spAutoFit/>
+          </a:bodyPr>
+          <a:lstStyle/>
+          <a:p>
+            <a:r>
+              <a:rPr lang="en-GB" sz="1200" dirty="0">
+                <a:solidFill>
+                  <a:schemeClr val="tx1">
+                    <a:lumMod val="75000"/>
+                    <a:lumOff val="25000"/>
+                  </a:schemeClr>
+                </a:solidFill>
+              </a:rPr>
+              <a:t>9/10</a:t>
+            </a:r>
+            <a:endParaRPr lang="en-CH" sz="1200" dirty="0">
+              <a:solidFill>
+                <a:schemeClr val="tx1">
+                  <a:lumMod val="75000"/>
+                  <a:lumOff val="25000"/>
+                </a:schemeClr>
+              </a:solidFill>
+            </a:endParaRPr>
+          </a:p>
+        </p:txBody>
+      </p:sp>
+      <p:pic>
+        <p:nvPicPr>
+          <p:cNvPr id="32" name="Grafik 31">
+            <a:extLst>
+              <a:ext uri="{FF2B5EF4-FFF2-40B4-BE49-F238E27FC236}">
+                <a16:creationId xmlns:a16="http://schemas.microsoft.com/office/drawing/2014/main" id="{065625AF-6A5F-0800-3BC8-01810D6DEDD2}"/>
+              </a:ext>
+            </a:extLst>
+          </p:cNvPr>
+          <p:cNvPicPr>
+            <a:picLocks noChangeAspect="1"/>
+          </p:cNvPicPr>
+          <p:nvPr/>
+        </p:nvPicPr>
+        <p:blipFill>
+          <a:blip r:embed="rId7"/>
+          <a:stretch>
+            <a:fillRect/>
+          </a:stretch>
+        </p:blipFill>
+        <p:spPr>
+          <a:xfrm>
+            <a:off x="3463923" y="2780228"/>
+            <a:ext cx="688866" cy="1057470"/>
+          </a:xfrm>
+          <a:prstGeom prst="rect">
+            <a:avLst/>
+          </a:prstGeom>
+        </p:spPr>
+      </p:pic>
+      <p:sp>
+        <p:nvSpPr>
+          <p:cNvPr id="33" name="TextBox 19">
+            <a:extLst>
+              <a:ext uri="{FF2B5EF4-FFF2-40B4-BE49-F238E27FC236}">
+                <a16:creationId xmlns:a16="http://schemas.microsoft.com/office/drawing/2014/main" id="{FBBADA8C-5B21-6992-7CC9-292F74D3CE67}"/>
+              </a:ext>
+            </a:extLst>
+          </p:cNvPr>
+          <p:cNvSpPr txBox="1"/>
+          <p:nvPr/>
+        </p:nvSpPr>
+        <p:spPr>
+          <a:xfrm>
+            <a:off x="3530620" y="3776514"/>
+            <a:ext cx="683198" cy="276999"/>
+          </a:xfrm>
+          <a:prstGeom prst="rect">
+            <a:avLst/>
+          </a:prstGeom>
+          <a:noFill/>
+        </p:spPr>
+        <p:txBody>
+          <a:bodyPr wrap="square" rtlCol="0">
+            <a:spAutoFit/>
+          </a:bodyPr>
+          <a:lstStyle/>
+          <a:p>
+            <a:r>
+              <a:rPr lang="en-GB" sz="1200" dirty="0">
+                <a:solidFill>
+                  <a:schemeClr val="tx1">
+                    <a:lumMod val="75000"/>
+                    <a:lumOff val="25000"/>
+                  </a:schemeClr>
+                </a:solidFill>
+              </a:rPr>
+              <a:t>8/10</a:t>
+            </a:r>
+            <a:endParaRPr lang="en-CH" sz="1200" dirty="0">
+              <a:solidFill>
+                <a:schemeClr val="tx1">
+                  <a:lumMod val="75000"/>
+                  <a:lumOff val="25000"/>
+                </a:schemeClr>
+              </a:solidFill>
+            </a:endParaRPr>
+          </a:p>
+        </p:txBody>
+      </p:sp>
+      <p:pic>
+        <p:nvPicPr>
+          <p:cNvPr id="36" name="Grafik 35" descr="Caretzeichen nach rechts mit einfarbiger Füllung">
+            <a:extLst>
+              <a:ext uri="{FF2B5EF4-FFF2-40B4-BE49-F238E27FC236}">
+                <a16:creationId xmlns:a16="http://schemas.microsoft.com/office/drawing/2014/main" id="{87CF94EF-6E75-88B8-D48F-CEA46611794A}"/>
+              </a:ext>
+            </a:extLst>
+          </p:cNvPr>
+          <p:cNvPicPr>
+            <a:picLocks noChangeAspect="1"/>
+          </p:cNvPicPr>
+          <p:nvPr/>
+        </p:nvPicPr>
+        <p:blipFill>
+          <a:blip r:embed="rId8">
+            <a:extLst>
+              <a:ext uri="{96DAC541-7B7A-43D3-8B79-37D633B846F1}">
+                <asvg:svgBlip xmlns:asvg="http://schemas.microsoft.com/office/drawing/2016/SVG/main" r:embed="rId9"/>
+              </a:ext>
+            </a:extLst>
+          </a:blip>
+          <a:stretch>
+            <a:fillRect/>
+          </a:stretch>
+        </p:blipFill>
+        <p:spPr>
+          <a:xfrm>
+            <a:off x="4131417" y="3206772"/>
+            <a:ext cx="261594" cy="261594"/>
+          </a:xfrm>
+          <a:prstGeom prst="rect">
+            <a:avLst/>
+          </a:prstGeom>
+        </p:spPr>
+      </p:pic>
+      <p:sp>
+        <p:nvSpPr>
+          <p:cNvPr id="37" name="TextBox 19">
+            <a:extLst>
+              <a:ext uri="{FF2B5EF4-FFF2-40B4-BE49-F238E27FC236}">
+                <a16:creationId xmlns:a16="http://schemas.microsoft.com/office/drawing/2014/main" id="{28A1C021-EDC9-4666-C131-8B33DBFD243D}"/>
+              </a:ext>
+            </a:extLst>
+          </p:cNvPr>
+          <p:cNvSpPr txBox="1"/>
+          <p:nvPr/>
+        </p:nvSpPr>
+        <p:spPr>
+          <a:xfrm>
+            <a:off x="2719778" y="4079619"/>
+            <a:ext cx="1555421" cy="461665"/>
+          </a:xfrm>
+          <a:prstGeom prst="rect">
+            <a:avLst/>
+          </a:prstGeom>
+          <a:noFill/>
+        </p:spPr>
+        <p:txBody>
+          <a:bodyPr wrap="square" rtlCol="0">
+            <a:spAutoFit/>
+          </a:bodyPr>
+          <a:lstStyle/>
+          <a:p>
+            <a:r>
+              <a:rPr lang="en-GB" sz="1200" u="sng" dirty="0">
+                <a:solidFill>
+                  <a:schemeClr val="accent1">
+                    <a:lumMod val="60000"/>
+                    <a:lumOff val="40000"/>
+                  </a:schemeClr>
+                </a:solidFill>
+              </a:rPr>
+              <a:t>Your friends are talking about…</a:t>
+            </a:r>
+            <a:endParaRPr lang="en-CH" sz="1200" u="sng" dirty="0">
+              <a:solidFill>
+                <a:schemeClr val="accent1">
+                  <a:lumMod val="60000"/>
+                  <a:lumOff val="40000"/>
+                </a:schemeClr>
+              </a:solidFill>
+            </a:endParaRPr>
+          </a:p>
+        </p:txBody>
+      </p:sp>
+      <p:sp>
+        <p:nvSpPr>
+          <p:cNvPr id="38" name="TextBox 19">
+            <a:extLst>
+              <a:ext uri="{FF2B5EF4-FFF2-40B4-BE49-F238E27FC236}">
+                <a16:creationId xmlns:a16="http://schemas.microsoft.com/office/drawing/2014/main" id="{317D0827-958F-63C6-3413-88147A3D08C5}"/>
+              </a:ext>
+            </a:extLst>
+          </p:cNvPr>
+          <p:cNvSpPr txBox="1"/>
+          <p:nvPr/>
+        </p:nvSpPr>
+        <p:spPr>
+          <a:xfrm>
+            <a:off x="2735344" y="4599181"/>
+            <a:ext cx="1555421" cy="276999"/>
+          </a:xfrm>
+          <a:prstGeom prst="rect">
+            <a:avLst/>
+          </a:prstGeom>
+          <a:noFill/>
+        </p:spPr>
+        <p:txBody>
+          <a:bodyPr wrap="square" rtlCol="0">
+            <a:spAutoFit/>
+          </a:bodyPr>
+          <a:lstStyle/>
+          <a:p>
+            <a:r>
+              <a:rPr lang="en-GB" sz="1200" u="sng" dirty="0">
+                <a:solidFill>
+                  <a:schemeClr val="accent1">
+                    <a:lumMod val="60000"/>
+                    <a:lumOff val="40000"/>
+                  </a:schemeClr>
+                </a:solidFill>
+              </a:rPr>
+              <a:t>What’s new this week</a:t>
+            </a:r>
+            <a:endParaRPr lang="en-CH" sz="1200" u="sng" dirty="0">
+              <a:solidFill>
+                <a:schemeClr val="accent1">
+                  <a:lumMod val="60000"/>
+                  <a:lumOff val="40000"/>
+                </a:schemeClr>
+              </a:solidFill>
+            </a:endParaRPr>
+          </a:p>
+        </p:txBody>
+      </p:sp>
+    </p:spTree>
+    <p:extLst>
+      <p:ext uri="{BB962C8B-B14F-4D97-AF65-F5344CB8AC3E}">
+        <p14:creationId xmlns:p14="http://schemas.microsoft.com/office/powerpoint/2010/main" val="2176997230"/>
+      </p:ext>
+    </p:extLst>
+  </p:cSld>
+  <p:clrMapOvr>
+    <a:masterClrMapping/>
+  </p:clrMapOvr>
+</p:sld>
+</file>
+
+<file path=ppt/slides/slide7.xml><?xml version="1.0" encoding="utf-8"?>
+<p:sld xmlns:a="http://schemas.openxmlformats.org/drawingml/2006/main" xmlns:r="http://schemas.openxmlformats.org/officeDocument/2006/relationships" xmlns:p="http://schemas.openxmlformats.org/presentationml/2006/main">
+  <p:cSld>
+    <p:spTree>
+      <p:nvGrpSpPr>
+        <p:cNvPr id="1" name=""/>
+        <p:cNvGrpSpPr/>
+        <p:nvPr/>
+      </p:nvGrpSpPr>
+      <p:grpSpPr>
+        <a:xfrm>
+          <a:off x="0" y="0"/>
+          <a:ext cx="0" cy="0"/>
+          <a:chOff x="0" y="0"/>
+          <a:chExt cx="0" cy="0"/>
+        </a:xfrm>
+      </p:grpSpPr>
+      <p:pic>
+        <p:nvPicPr>
+          <p:cNvPr id="18" name="Grafik 17" descr="Smartphone Silhouette">
+            <a:extLst>
+              <a:ext uri="{FF2B5EF4-FFF2-40B4-BE49-F238E27FC236}">
+                <a16:creationId xmlns:a16="http://schemas.microsoft.com/office/drawing/2014/main" id="{A7D45A6C-38DD-D8D3-0F09-3664A204B36B}"/>
+              </a:ext>
+            </a:extLst>
+          </p:cNvPr>
+          <p:cNvPicPr>
+            <a:picLocks noChangeAspect="1"/>
+          </p:cNvPicPr>
+          <p:nvPr/>
+        </p:nvPicPr>
+        <p:blipFill>
+          <a:blip r:embed="rId2">
+            <a:extLst>
+              <a:ext uri="{96DAC541-7B7A-43D3-8B79-37D633B846F1}">
+                <asvg:svgBlip xmlns:asvg="http://schemas.microsoft.com/office/drawing/2016/SVG/main" r:embed="rId3"/>
+              </a:ext>
+            </a:extLst>
+          </a:blip>
+          <a:stretch>
+            <a:fillRect/>
+          </a:stretch>
+        </p:blipFill>
+        <p:spPr>
+          <a:xfrm>
+            <a:off x="1321443" y="1478666"/>
+            <a:ext cx="4435998" cy="4435998"/>
+          </a:xfrm>
+          <a:prstGeom prst="rect">
+            <a:avLst/>
+          </a:prstGeom>
+        </p:spPr>
+      </p:pic>
+      <p:sp>
+        <p:nvSpPr>
+          <p:cNvPr id="23" name="TextBox 19">
+            <a:extLst>
+              <a:ext uri="{FF2B5EF4-FFF2-40B4-BE49-F238E27FC236}">
+                <a16:creationId xmlns:a16="http://schemas.microsoft.com/office/drawing/2014/main" id="{3AC62F3B-0D44-3AE2-6480-AAFA27EC7650}"/>
+              </a:ext>
+            </a:extLst>
+          </p:cNvPr>
+          <p:cNvSpPr txBox="1"/>
+          <p:nvPr/>
+        </p:nvSpPr>
+        <p:spPr>
+          <a:xfrm>
+            <a:off x="2691208" y="2247637"/>
+            <a:ext cx="1136075" cy="369332"/>
+          </a:xfrm>
+          <a:prstGeom prst="rect">
+            <a:avLst/>
+          </a:prstGeom>
+          <a:noFill/>
+        </p:spPr>
+        <p:txBody>
+          <a:bodyPr wrap="square" rtlCol="0">
+            <a:spAutoFit/>
+          </a:bodyPr>
+          <a:lstStyle/>
+          <a:p>
+            <a:r>
+              <a:rPr lang="en-GB" dirty="0">
+                <a:solidFill>
+                  <a:schemeClr val="accent6"/>
+                </a:solidFill>
+              </a:rPr>
+              <a:t>BIMDb</a:t>
+            </a:r>
+            <a:endParaRPr lang="en-CH" dirty="0">
+              <a:solidFill>
+                <a:schemeClr val="accent6"/>
+              </a:solidFill>
+            </a:endParaRPr>
+          </a:p>
+        </p:txBody>
+      </p:sp>
+      <p:pic>
+        <p:nvPicPr>
+          <p:cNvPr id="25" name="Grafik 24" descr="Rufton mit einfarbiger Füllung">
+            <a:extLst>
+              <a:ext uri="{FF2B5EF4-FFF2-40B4-BE49-F238E27FC236}">
+                <a16:creationId xmlns:a16="http://schemas.microsoft.com/office/drawing/2014/main" id="{D4CC9D33-6BF7-2DAE-B1F5-C9488A5707C5}"/>
+              </a:ext>
+            </a:extLst>
+          </p:cNvPr>
+          <p:cNvPicPr>
+            <a:picLocks noChangeAspect="1"/>
+          </p:cNvPicPr>
+          <p:nvPr/>
+        </p:nvPicPr>
+        <p:blipFill>
+          <a:blip r:embed="rId4">
+            <a:extLst>
+              <a:ext uri="{96DAC541-7B7A-43D3-8B79-37D633B846F1}">
+                <asvg:svgBlip xmlns:asvg="http://schemas.microsoft.com/office/drawing/2016/SVG/main" r:embed="rId5"/>
+              </a:ext>
+            </a:extLst>
+          </a:blip>
+          <a:stretch>
+            <a:fillRect/>
+          </a:stretch>
+        </p:blipFill>
+        <p:spPr>
+          <a:xfrm>
+            <a:off x="4017389" y="2282259"/>
+            <a:ext cx="300087" cy="300087"/>
+          </a:xfrm>
+          <a:prstGeom prst="rect">
+            <a:avLst/>
+          </a:prstGeom>
+        </p:spPr>
+      </p:pic>
+      <p:cxnSp>
+        <p:nvCxnSpPr>
+          <p:cNvPr id="27" name="Gerader Verbinder 26">
+            <a:extLst>
+              <a:ext uri="{FF2B5EF4-FFF2-40B4-BE49-F238E27FC236}">
+                <a16:creationId xmlns:a16="http://schemas.microsoft.com/office/drawing/2014/main" id="{4BAB1880-A23D-7E0D-D8A8-71638D76DBB2}"/>
+              </a:ext>
+            </a:extLst>
+          </p:cNvPr>
+          <p:cNvCxnSpPr/>
+          <p:nvPr/>
+        </p:nvCxnSpPr>
+        <p:spPr>
+          <a:xfrm>
+            <a:off x="2780908" y="2658356"/>
+            <a:ext cx="1555422" cy="0"/>
+          </a:xfrm>
+          <a:prstGeom prst="line">
+            <a:avLst/>
+          </a:prstGeom>
+          <a:ln>
+            <a:solidFill>
+              <a:schemeClr val="tx1">
+                <a:lumMod val="75000"/>
+                <a:lumOff val="25000"/>
+              </a:schemeClr>
+            </a:solidFill>
+          </a:ln>
+        </p:spPr>
+        <p:style>
+          <a:lnRef idx="1">
+            <a:schemeClr val="accent1"/>
+          </a:lnRef>
+          <a:fillRef idx="0">
+            <a:schemeClr val="accent1"/>
+          </a:fillRef>
+          <a:effectRef idx="0">
+            <a:schemeClr val="accent1"/>
+          </a:effectRef>
+          <a:fontRef idx="minor">
+            <a:schemeClr val="tx1"/>
+          </a:fontRef>
+        </p:style>
+      </p:cxnSp>
+      <p:sp>
+        <p:nvSpPr>
+          <p:cNvPr id="4" name="TextBox 19">
+            <a:extLst>
+              <a:ext uri="{FF2B5EF4-FFF2-40B4-BE49-F238E27FC236}">
+                <a16:creationId xmlns:a16="http://schemas.microsoft.com/office/drawing/2014/main" id="{D47AB2CB-4503-2DBF-0E54-6D6C978871D2}"/>
+              </a:ext>
+            </a:extLst>
+          </p:cNvPr>
+          <p:cNvSpPr txBox="1"/>
+          <p:nvPr/>
+        </p:nvSpPr>
+        <p:spPr>
+          <a:xfrm>
+            <a:off x="2736058" y="2748008"/>
+            <a:ext cx="1645122" cy="276999"/>
+          </a:xfrm>
+          <a:prstGeom prst="rect">
+            <a:avLst/>
+          </a:prstGeom>
+          <a:noFill/>
+        </p:spPr>
+        <p:txBody>
+          <a:bodyPr wrap="square" rtlCol="0">
+            <a:spAutoFit/>
+          </a:bodyPr>
+          <a:lstStyle/>
+          <a:p>
+            <a:r>
+              <a:rPr lang="en-GB" sz="1200" b="1" dirty="0">
+                <a:solidFill>
+                  <a:schemeClr val="tx1">
+                    <a:lumMod val="75000"/>
+                    <a:lumOff val="25000"/>
+                  </a:schemeClr>
+                </a:solidFill>
+              </a:rPr>
+              <a:t>John Wick: Chapter 4</a:t>
+            </a:r>
+            <a:endParaRPr lang="en-CH" sz="1200" b="1" dirty="0">
+              <a:solidFill>
+                <a:schemeClr val="tx1">
+                  <a:lumMod val="75000"/>
+                  <a:lumOff val="25000"/>
+                </a:schemeClr>
+              </a:solidFill>
+            </a:endParaRPr>
+          </a:p>
+        </p:txBody>
+      </p:sp>
+      <p:pic>
+        <p:nvPicPr>
+          <p:cNvPr id="7" name="Grafik 6">
+            <a:extLst>
+              <a:ext uri="{FF2B5EF4-FFF2-40B4-BE49-F238E27FC236}">
+                <a16:creationId xmlns:a16="http://schemas.microsoft.com/office/drawing/2014/main" id="{168A16D3-9FBF-3132-971C-8D75FDF1D61B}"/>
+              </a:ext>
+            </a:extLst>
+          </p:cNvPr>
+          <p:cNvPicPr>
+            <a:picLocks noChangeAspect="1"/>
+          </p:cNvPicPr>
+          <p:nvPr/>
+        </p:nvPicPr>
+        <p:blipFill>
+          <a:blip r:embed="rId6"/>
+          <a:stretch>
+            <a:fillRect/>
+          </a:stretch>
+        </p:blipFill>
+        <p:spPr>
+          <a:xfrm>
+            <a:off x="2758506" y="3064431"/>
+            <a:ext cx="1558970" cy="315025"/>
+          </a:xfrm>
+          <a:prstGeom prst="rect">
+            <a:avLst/>
+          </a:prstGeom>
+        </p:spPr>
+      </p:pic>
+      <p:pic>
+        <p:nvPicPr>
+          <p:cNvPr id="11" name="Grafik 10">
+            <a:extLst>
+              <a:ext uri="{FF2B5EF4-FFF2-40B4-BE49-F238E27FC236}">
+                <a16:creationId xmlns:a16="http://schemas.microsoft.com/office/drawing/2014/main" id="{0A8101AC-E979-5460-87B7-A12425562F41}"/>
+              </a:ext>
+            </a:extLst>
+          </p:cNvPr>
+          <p:cNvPicPr>
+            <a:picLocks noChangeAspect="1"/>
+          </p:cNvPicPr>
+          <p:nvPr/>
+        </p:nvPicPr>
+        <p:blipFill>
+          <a:blip r:embed="rId7"/>
+          <a:stretch>
+            <a:fillRect/>
+          </a:stretch>
+        </p:blipFill>
+        <p:spPr>
+          <a:xfrm>
+            <a:off x="2758506" y="3478545"/>
+            <a:ext cx="1558969" cy="495620"/>
+          </a:xfrm>
+          <a:prstGeom prst="rect">
+            <a:avLst/>
+          </a:prstGeom>
+        </p:spPr>
+      </p:pic>
+      <p:sp>
+        <p:nvSpPr>
+          <p:cNvPr id="15" name="Textfeld 14">
+            <a:extLst>
+              <a:ext uri="{FF2B5EF4-FFF2-40B4-BE49-F238E27FC236}">
+                <a16:creationId xmlns:a16="http://schemas.microsoft.com/office/drawing/2014/main" id="{60D202F3-31F8-0FE6-106D-CE5543BA88AD}"/>
+              </a:ext>
+            </a:extLst>
+          </p:cNvPr>
+          <p:cNvSpPr txBox="1"/>
+          <p:nvPr/>
+        </p:nvSpPr>
+        <p:spPr>
+          <a:xfrm>
+            <a:off x="2691208" y="3974165"/>
+            <a:ext cx="1767670" cy="954107"/>
+          </a:xfrm>
+          <a:prstGeom prst="rect">
+            <a:avLst/>
+          </a:prstGeom>
+          <a:noFill/>
+        </p:spPr>
+        <p:txBody>
+          <a:bodyPr wrap="square">
+            <a:spAutoFit/>
+          </a:bodyPr>
+          <a:lstStyle/>
+          <a:p>
+            <a:r>
+              <a:rPr lang="en-US" sz="800" dirty="0"/>
+              <a:t>John Wick uncovers a path to defeating The High Table. But before he can earn his freedom, Wick must face off against a new enemy with powerful alliances across the globe and forces that turn old friends into foes.</a:t>
+            </a:r>
+            <a:endParaRPr lang="de-CH" sz="800" dirty="0"/>
+          </a:p>
+        </p:txBody>
+      </p:sp>
+      <p:sp>
+        <p:nvSpPr>
+          <p:cNvPr id="17" name="TextBox 19">
+            <a:extLst>
+              <a:ext uri="{FF2B5EF4-FFF2-40B4-BE49-F238E27FC236}">
+                <a16:creationId xmlns:a16="http://schemas.microsoft.com/office/drawing/2014/main" id="{81A7794A-58D1-9DD6-78EB-E52BD6899D15}"/>
+              </a:ext>
+            </a:extLst>
+          </p:cNvPr>
+          <p:cNvSpPr txBox="1"/>
+          <p:nvPr/>
+        </p:nvSpPr>
+        <p:spPr>
+          <a:xfrm>
+            <a:off x="2700635" y="4879997"/>
+            <a:ext cx="1555421" cy="276999"/>
+          </a:xfrm>
+          <a:prstGeom prst="rect">
+            <a:avLst/>
+          </a:prstGeom>
+          <a:noFill/>
+        </p:spPr>
+        <p:txBody>
+          <a:bodyPr wrap="square" rtlCol="0">
+            <a:spAutoFit/>
+          </a:bodyPr>
+          <a:lstStyle/>
+          <a:p>
+            <a:r>
+              <a:rPr lang="en-GB" sz="1200" u="sng" dirty="0">
+                <a:solidFill>
+                  <a:schemeClr val="accent1">
+                    <a:lumMod val="60000"/>
+                    <a:lumOff val="40000"/>
+                  </a:schemeClr>
+                </a:solidFill>
+              </a:rPr>
+              <a:t>Check bias</a:t>
+            </a:r>
+            <a:endParaRPr lang="en-CH" sz="1200" u="sng" dirty="0">
+              <a:solidFill>
+                <a:schemeClr val="accent1">
+                  <a:lumMod val="60000"/>
+                  <a:lumOff val="40000"/>
+                </a:schemeClr>
+              </a:solidFill>
+            </a:endParaRPr>
+          </a:p>
+        </p:txBody>
+      </p:sp>
+    </p:spTree>
+    <p:extLst>
+      <p:ext uri="{BB962C8B-B14F-4D97-AF65-F5344CB8AC3E}">
+        <p14:creationId xmlns:p14="http://schemas.microsoft.com/office/powerpoint/2010/main" val="510295249"/>
+      </p:ext>
+    </p:extLst>
+  </p:cSld>
+  <p:clrMapOvr>
+    <a:masterClrMapping/>
+  </p:clrMapOvr>
+</p:sld>
+</file>
+
+<file path=ppt/slides/slide8.xml><?xml version="1.0" encoding="utf-8"?>
+<p:sld xmlns:a="http://schemas.openxmlformats.org/drawingml/2006/main" xmlns:r="http://schemas.openxmlformats.org/officeDocument/2006/relationships" xmlns:p="http://schemas.openxmlformats.org/presentationml/2006/main">
+  <p:cSld>
+    <p:spTree>
+      <p:nvGrpSpPr>
+        <p:cNvPr id="1" name=""/>
+        <p:cNvGrpSpPr/>
+        <p:nvPr/>
+      </p:nvGrpSpPr>
+      <p:grpSpPr>
+        <a:xfrm>
+          <a:off x="0" y="0"/>
+          <a:ext cx="0" cy="0"/>
+          <a:chOff x="0" y="0"/>
+          <a:chExt cx="0" cy="0"/>
+        </a:xfrm>
+      </p:grpSpPr>
+      <p:pic>
+        <p:nvPicPr>
+          <p:cNvPr id="18" name="Grafik 17" descr="Smartphone Silhouette">
+            <a:extLst>
+              <a:ext uri="{FF2B5EF4-FFF2-40B4-BE49-F238E27FC236}">
+                <a16:creationId xmlns:a16="http://schemas.microsoft.com/office/drawing/2014/main" id="{A7D45A6C-38DD-D8D3-0F09-3664A204B36B}"/>
+              </a:ext>
+            </a:extLst>
+          </p:cNvPr>
+          <p:cNvPicPr>
+            <a:picLocks noChangeAspect="1"/>
+          </p:cNvPicPr>
+          <p:nvPr/>
+        </p:nvPicPr>
+        <p:blipFill>
+          <a:blip r:embed="rId2">
+            <a:extLst>
+              <a:ext uri="{96DAC541-7B7A-43D3-8B79-37D633B846F1}">
+                <asvg:svgBlip xmlns:asvg="http://schemas.microsoft.com/office/drawing/2016/SVG/main" r:embed="rId3"/>
+              </a:ext>
+            </a:extLst>
+          </a:blip>
+          <a:stretch>
+            <a:fillRect/>
+          </a:stretch>
+        </p:blipFill>
+        <p:spPr>
+          <a:xfrm>
+            <a:off x="1321443" y="1478666"/>
+            <a:ext cx="4435998" cy="4435998"/>
+          </a:xfrm>
+          <a:prstGeom prst="rect">
+            <a:avLst/>
+          </a:prstGeom>
+        </p:spPr>
+      </p:pic>
+      <p:sp>
+        <p:nvSpPr>
+          <p:cNvPr id="23" name="TextBox 19">
+            <a:extLst>
+              <a:ext uri="{FF2B5EF4-FFF2-40B4-BE49-F238E27FC236}">
+                <a16:creationId xmlns:a16="http://schemas.microsoft.com/office/drawing/2014/main" id="{3AC62F3B-0D44-3AE2-6480-AAFA27EC7650}"/>
+              </a:ext>
+            </a:extLst>
+          </p:cNvPr>
+          <p:cNvSpPr txBox="1"/>
+          <p:nvPr/>
+        </p:nvSpPr>
+        <p:spPr>
+          <a:xfrm>
+            <a:off x="2691208" y="2247637"/>
+            <a:ext cx="1136075" cy="369332"/>
+          </a:xfrm>
+          <a:prstGeom prst="rect">
+            <a:avLst/>
+          </a:prstGeom>
+          <a:noFill/>
+        </p:spPr>
+        <p:txBody>
+          <a:bodyPr wrap="square" rtlCol="0">
+            <a:spAutoFit/>
+          </a:bodyPr>
+          <a:lstStyle/>
+          <a:p>
+            <a:r>
+              <a:rPr lang="en-GB" dirty="0">
+                <a:solidFill>
+                  <a:schemeClr val="accent6"/>
+                </a:solidFill>
+              </a:rPr>
+              <a:t>BIMDb</a:t>
+            </a:r>
+            <a:endParaRPr lang="en-CH" dirty="0">
+              <a:solidFill>
+                <a:schemeClr val="accent6"/>
+              </a:solidFill>
+            </a:endParaRPr>
+          </a:p>
+        </p:txBody>
+      </p:sp>
+      <p:pic>
+        <p:nvPicPr>
+          <p:cNvPr id="25" name="Grafik 24" descr="Rufton mit einfarbiger Füllung">
+            <a:extLst>
+              <a:ext uri="{FF2B5EF4-FFF2-40B4-BE49-F238E27FC236}">
+                <a16:creationId xmlns:a16="http://schemas.microsoft.com/office/drawing/2014/main" id="{D4CC9D33-6BF7-2DAE-B1F5-C9488A5707C5}"/>
+              </a:ext>
+            </a:extLst>
+          </p:cNvPr>
+          <p:cNvPicPr>
+            <a:picLocks noChangeAspect="1"/>
+          </p:cNvPicPr>
+          <p:nvPr/>
+        </p:nvPicPr>
+        <p:blipFill>
+          <a:blip r:embed="rId4">
+            <a:extLst>
+              <a:ext uri="{96DAC541-7B7A-43D3-8B79-37D633B846F1}">
+                <asvg:svgBlip xmlns:asvg="http://schemas.microsoft.com/office/drawing/2016/SVG/main" r:embed="rId5"/>
+              </a:ext>
+            </a:extLst>
+          </a:blip>
+          <a:stretch>
+            <a:fillRect/>
+          </a:stretch>
+        </p:blipFill>
+        <p:spPr>
+          <a:xfrm>
+            <a:off x="4017389" y="2282259"/>
+            <a:ext cx="300087" cy="300087"/>
+          </a:xfrm>
+          <a:prstGeom prst="rect">
+            <a:avLst/>
+          </a:prstGeom>
+        </p:spPr>
+      </p:pic>
+      <p:cxnSp>
+        <p:nvCxnSpPr>
+          <p:cNvPr id="27" name="Gerader Verbinder 26">
+            <a:extLst>
+              <a:ext uri="{FF2B5EF4-FFF2-40B4-BE49-F238E27FC236}">
+                <a16:creationId xmlns:a16="http://schemas.microsoft.com/office/drawing/2014/main" id="{4BAB1880-A23D-7E0D-D8A8-71638D76DBB2}"/>
+              </a:ext>
+            </a:extLst>
+          </p:cNvPr>
+          <p:cNvCxnSpPr/>
+          <p:nvPr/>
+        </p:nvCxnSpPr>
+        <p:spPr>
+          <a:xfrm>
+            <a:off x="2780908" y="2658356"/>
+            <a:ext cx="1555422" cy="0"/>
+          </a:xfrm>
+          <a:prstGeom prst="line">
+            <a:avLst/>
+          </a:prstGeom>
+          <a:ln>
+            <a:solidFill>
+              <a:schemeClr val="tx1">
+                <a:lumMod val="75000"/>
+                <a:lumOff val="25000"/>
+              </a:schemeClr>
+            </a:solidFill>
+          </a:ln>
+        </p:spPr>
+        <p:style>
+          <a:lnRef idx="1">
+            <a:schemeClr val="accent1"/>
+          </a:lnRef>
+          <a:fillRef idx="0">
+            <a:schemeClr val="accent1"/>
+          </a:fillRef>
+          <a:effectRef idx="0">
+            <a:schemeClr val="accent1"/>
+          </a:effectRef>
+          <a:fontRef idx="minor">
+            <a:schemeClr val="tx1"/>
+          </a:fontRef>
+        </p:style>
+      </p:cxnSp>
+      <p:sp>
+        <p:nvSpPr>
+          <p:cNvPr id="4" name="TextBox 19">
+            <a:extLst>
+              <a:ext uri="{FF2B5EF4-FFF2-40B4-BE49-F238E27FC236}">
+                <a16:creationId xmlns:a16="http://schemas.microsoft.com/office/drawing/2014/main" id="{D47AB2CB-4503-2DBF-0E54-6D6C978871D2}"/>
+              </a:ext>
+            </a:extLst>
+          </p:cNvPr>
+          <p:cNvSpPr txBox="1"/>
+          <p:nvPr/>
+        </p:nvSpPr>
+        <p:spPr>
+          <a:xfrm>
+            <a:off x="2736058" y="2748008"/>
+            <a:ext cx="1645122" cy="276999"/>
+          </a:xfrm>
+          <a:prstGeom prst="rect">
+            <a:avLst/>
+          </a:prstGeom>
+          <a:noFill/>
+        </p:spPr>
+        <p:txBody>
+          <a:bodyPr wrap="square" rtlCol="0">
+            <a:spAutoFit/>
+          </a:bodyPr>
+          <a:lstStyle/>
+          <a:p>
+            <a:r>
+              <a:rPr lang="de-CH" sz="1200" b="1" dirty="0">
+                <a:solidFill>
+                  <a:schemeClr val="tx1">
+                    <a:lumMod val="75000"/>
+                    <a:lumOff val="25000"/>
+                  </a:schemeClr>
+                </a:solidFill>
+              </a:rPr>
+              <a:t>Social Media Browser</a:t>
+            </a:r>
+            <a:endParaRPr lang="en-CH" sz="1200" b="1" dirty="0">
+              <a:solidFill>
+                <a:schemeClr val="tx1">
+                  <a:lumMod val="75000"/>
+                  <a:lumOff val="25000"/>
+                </a:schemeClr>
+              </a:solidFill>
+            </a:endParaRPr>
+          </a:p>
+        </p:txBody>
+      </p:sp>
+      <p:pic>
+        <p:nvPicPr>
+          <p:cNvPr id="3" name="Grafik 2">
+            <a:extLst>
+              <a:ext uri="{FF2B5EF4-FFF2-40B4-BE49-F238E27FC236}">
+                <a16:creationId xmlns:a16="http://schemas.microsoft.com/office/drawing/2014/main" id="{46E9B3A1-BE5A-E160-3F34-22C5063C305A}"/>
+              </a:ext>
+            </a:extLst>
+          </p:cNvPr>
+          <p:cNvPicPr>
+            <a:picLocks noChangeAspect="1"/>
+          </p:cNvPicPr>
+          <p:nvPr/>
+        </p:nvPicPr>
+        <p:blipFill>
+          <a:blip r:embed="rId6"/>
+          <a:stretch>
+            <a:fillRect/>
+          </a:stretch>
+        </p:blipFill>
+        <p:spPr>
+          <a:xfrm>
+            <a:off x="3075760" y="3068475"/>
+            <a:ext cx="361950" cy="323850"/>
+          </a:xfrm>
+          <a:prstGeom prst="rect">
+            <a:avLst/>
+          </a:prstGeom>
+        </p:spPr>
+      </p:pic>
+      <p:sp>
+        <p:nvSpPr>
+          <p:cNvPr id="5" name="Textfeld 4">
+            <a:extLst>
+              <a:ext uri="{FF2B5EF4-FFF2-40B4-BE49-F238E27FC236}">
+                <a16:creationId xmlns:a16="http://schemas.microsoft.com/office/drawing/2014/main" id="{A48298B4-AC74-8A39-5148-8C294B73F990}"/>
+              </a:ext>
+            </a:extLst>
+          </p:cNvPr>
+          <p:cNvSpPr txBox="1"/>
+          <p:nvPr/>
+        </p:nvSpPr>
+        <p:spPr>
+          <a:xfrm>
+            <a:off x="2715461" y="3346949"/>
+            <a:ext cx="541274" cy="215444"/>
+          </a:xfrm>
+          <a:prstGeom prst="rect">
+            <a:avLst/>
+          </a:prstGeom>
+          <a:noFill/>
+        </p:spPr>
+        <p:txBody>
+          <a:bodyPr wrap="square">
+            <a:spAutoFit/>
+          </a:bodyPr>
+          <a:lstStyle/>
+          <a:p>
+            <a:r>
+              <a:rPr lang="en-US" sz="800" dirty="0"/>
+              <a:t>Peter</a:t>
+            </a:r>
+            <a:endParaRPr lang="de-CH" sz="800" dirty="0"/>
+          </a:p>
+        </p:txBody>
+      </p:sp>
+      <p:sp>
+        <p:nvSpPr>
+          <p:cNvPr id="6" name="Rechteck 5">
+            <a:extLst>
+              <a:ext uri="{FF2B5EF4-FFF2-40B4-BE49-F238E27FC236}">
+                <a16:creationId xmlns:a16="http://schemas.microsoft.com/office/drawing/2014/main" id="{EEA893F1-6C61-D43A-B7B0-A710059C925C}"/>
+              </a:ext>
+            </a:extLst>
+          </p:cNvPr>
+          <p:cNvSpPr/>
+          <p:nvPr/>
+        </p:nvSpPr>
+        <p:spPr>
+          <a:xfrm>
+            <a:off x="2756054" y="3512919"/>
+            <a:ext cx="1561422" cy="414780"/>
+          </a:xfrm>
+          <a:prstGeom prst="rect">
+            <a:avLst/>
+          </a:prstGeom>
+          <a:solidFill>
+            <a:schemeClr val="accent1">
+              <a:lumMod val="20000"/>
+              <a:lumOff val="80000"/>
+            </a:schemeClr>
+          </a:solidFill>
+        </p:spPr>
+        <p:style>
+          <a:lnRef idx="2">
+            <a:schemeClr val="accent1">
+              <a:shade val="50000"/>
+            </a:schemeClr>
+          </a:lnRef>
+          <a:fillRef idx="1">
+            <a:schemeClr val="accent1"/>
+          </a:fillRef>
+          <a:effectRef idx="0">
+            <a:schemeClr val="accent1"/>
+          </a:effectRef>
+          <a:fontRef idx="minor">
+            <a:schemeClr val="lt1"/>
+          </a:fontRef>
+        </p:style>
+        <p:txBody>
+          <a:bodyPr rtlCol="0" anchor="ctr"/>
+          <a:lstStyle/>
+          <a:p>
+            <a:r>
+              <a:rPr lang="en-US" sz="800" dirty="0">
+                <a:solidFill>
+                  <a:schemeClr val="tx1">
+                    <a:lumMod val="75000"/>
+                    <a:lumOff val="25000"/>
+                  </a:schemeClr>
+                </a:solidFill>
+              </a:rPr>
+              <a:t>I liked the new movie blablablabl balbal blubl bliblbibulbilub bbibibbididid blub blabala</a:t>
+            </a:r>
+            <a:endParaRPr lang="de-CH" sz="800" dirty="0">
+              <a:solidFill>
+                <a:schemeClr val="tx1">
+                  <a:lumMod val="75000"/>
+                  <a:lumOff val="25000"/>
+                </a:schemeClr>
+              </a:solidFill>
+            </a:endParaRPr>
+          </a:p>
+        </p:txBody>
+      </p:sp>
+      <p:sp>
+        <p:nvSpPr>
+          <p:cNvPr id="8" name="TextBox 19">
+            <a:extLst>
+              <a:ext uri="{FF2B5EF4-FFF2-40B4-BE49-F238E27FC236}">
+                <a16:creationId xmlns:a16="http://schemas.microsoft.com/office/drawing/2014/main" id="{E9825C42-6FE1-ACC3-8200-D3C18560F5BB}"/>
+              </a:ext>
+            </a:extLst>
+          </p:cNvPr>
+          <p:cNvSpPr txBox="1"/>
+          <p:nvPr/>
+        </p:nvSpPr>
+        <p:spPr>
+          <a:xfrm>
+            <a:off x="2756054" y="3079975"/>
+            <a:ext cx="361950" cy="276999"/>
+          </a:xfrm>
+          <a:prstGeom prst="rect">
+            <a:avLst/>
+          </a:prstGeom>
+          <a:noFill/>
+        </p:spPr>
+        <p:txBody>
+          <a:bodyPr wrap="square" rtlCol="0">
+            <a:spAutoFit/>
+          </a:bodyPr>
+          <a:lstStyle/>
+          <a:p>
+            <a:r>
+              <a:rPr lang="de-CH" sz="1200" dirty="0">
+                <a:solidFill>
+                  <a:schemeClr val="tx1">
+                    <a:lumMod val="75000"/>
+                    <a:lumOff val="25000"/>
+                  </a:schemeClr>
+                </a:solidFill>
+              </a:rPr>
+              <a:t>on</a:t>
+            </a:r>
+            <a:endParaRPr lang="en-CH" sz="1200" dirty="0">
+              <a:solidFill>
+                <a:schemeClr val="tx1">
+                  <a:lumMod val="75000"/>
+                  <a:lumOff val="25000"/>
+                </a:schemeClr>
+              </a:solidFill>
+            </a:endParaRPr>
+          </a:p>
+        </p:txBody>
+      </p:sp>
+      <p:cxnSp>
+        <p:nvCxnSpPr>
+          <p:cNvPr id="10" name="Gerade Verbindung mit Pfeil 9">
+            <a:extLst>
+              <a:ext uri="{FF2B5EF4-FFF2-40B4-BE49-F238E27FC236}">
+                <a16:creationId xmlns:a16="http://schemas.microsoft.com/office/drawing/2014/main" id="{CEC2C4C6-219F-6174-E577-13CDC794D27C}"/>
+              </a:ext>
+            </a:extLst>
+          </p:cNvPr>
+          <p:cNvCxnSpPr/>
+          <p:nvPr/>
+        </p:nvCxnSpPr>
+        <p:spPr>
+          <a:xfrm>
+            <a:off x="2937029" y="3927699"/>
+            <a:ext cx="0" cy="276656"/>
+          </a:xfrm>
+          <a:prstGeom prst="straightConnector1">
+            <a:avLst/>
+          </a:prstGeom>
+          <a:ln>
+            <a:tailEnd type="triangle"/>
+          </a:ln>
+        </p:spPr>
+        <p:style>
+          <a:lnRef idx="1">
+            <a:schemeClr val="accent1"/>
+          </a:lnRef>
+          <a:fillRef idx="0">
+            <a:schemeClr val="accent1"/>
+          </a:fillRef>
+          <a:effectRef idx="0">
+            <a:schemeClr val="accent1"/>
+          </a:effectRef>
+          <a:fontRef idx="minor">
+            <a:schemeClr val="tx1"/>
+          </a:fontRef>
+        </p:style>
+      </p:cxnSp>
+      <p:sp>
+        <p:nvSpPr>
+          <p:cNvPr id="12" name="Textfeld 11">
+            <a:extLst>
+              <a:ext uri="{FF2B5EF4-FFF2-40B4-BE49-F238E27FC236}">
+                <a16:creationId xmlns:a16="http://schemas.microsoft.com/office/drawing/2014/main" id="{A540E74B-77B0-CA9F-3C28-9B336B5F0036}"/>
+              </a:ext>
+            </a:extLst>
+          </p:cNvPr>
+          <p:cNvSpPr txBox="1"/>
+          <p:nvPr/>
+        </p:nvSpPr>
+        <p:spPr>
+          <a:xfrm>
+            <a:off x="2715461" y="4184608"/>
+            <a:ext cx="541274" cy="215444"/>
+          </a:xfrm>
+          <a:prstGeom prst="rect">
+            <a:avLst/>
+          </a:prstGeom>
+          <a:noFill/>
+        </p:spPr>
+        <p:txBody>
+          <a:bodyPr wrap="square">
+            <a:spAutoFit/>
+          </a:bodyPr>
+          <a:lstStyle/>
+          <a:p>
+            <a:r>
+              <a:rPr lang="en-US" sz="800" dirty="0"/>
+              <a:t>Anna</a:t>
+            </a:r>
+            <a:endParaRPr lang="de-CH" sz="800" dirty="0"/>
+          </a:p>
+        </p:txBody>
+      </p:sp>
+      <p:sp>
+        <p:nvSpPr>
+          <p:cNvPr id="13" name="Rechteck 12">
+            <a:extLst>
+              <a:ext uri="{FF2B5EF4-FFF2-40B4-BE49-F238E27FC236}">
+                <a16:creationId xmlns:a16="http://schemas.microsoft.com/office/drawing/2014/main" id="{A8F0F9F7-54DB-EBEE-3348-C141A0CBEC60}"/>
+              </a:ext>
+            </a:extLst>
+          </p:cNvPr>
+          <p:cNvSpPr/>
+          <p:nvPr/>
+        </p:nvSpPr>
+        <p:spPr>
+          <a:xfrm>
+            <a:off x="2756054" y="4350578"/>
+            <a:ext cx="1561422" cy="414780"/>
+          </a:xfrm>
+          <a:prstGeom prst="rect">
+            <a:avLst/>
+          </a:prstGeom>
+          <a:solidFill>
+            <a:schemeClr val="accent1">
+              <a:lumMod val="20000"/>
+              <a:lumOff val="80000"/>
+            </a:schemeClr>
+          </a:solidFill>
+        </p:spPr>
+        <p:style>
+          <a:lnRef idx="2">
+            <a:schemeClr val="accent1">
+              <a:shade val="50000"/>
+            </a:schemeClr>
+          </a:lnRef>
+          <a:fillRef idx="1">
+            <a:schemeClr val="accent1"/>
+          </a:fillRef>
+          <a:effectRef idx="0">
+            <a:schemeClr val="accent1"/>
+          </a:effectRef>
+          <a:fontRef idx="minor">
+            <a:schemeClr val="lt1"/>
+          </a:fontRef>
+        </p:style>
+        <p:txBody>
+          <a:bodyPr rtlCol="0" anchor="ctr"/>
+          <a:lstStyle/>
+          <a:p>
+            <a:r>
+              <a:rPr lang="en-US" sz="800" dirty="0">
+                <a:solidFill>
+                  <a:schemeClr val="tx1">
+                    <a:lumMod val="75000"/>
+                    <a:lumOff val="25000"/>
+                  </a:schemeClr>
+                </a:solidFill>
+              </a:rPr>
+              <a:t>Especially the scene with ... Have to say, the check bias feature is amazingly accurate</a:t>
+            </a:r>
+            <a:endParaRPr lang="de-CH" sz="800" dirty="0">
+              <a:solidFill>
+                <a:schemeClr val="tx1">
+                  <a:lumMod val="75000"/>
+                  <a:lumOff val="25000"/>
+                </a:schemeClr>
+              </a:solidFill>
+            </a:endParaRPr>
+          </a:p>
+        </p:txBody>
+      </p:sp>
+    </p:spTree>
+    <p:extLst>
+      <p:ext uri="{BB962C8B-B14F-4D97-AF65-F5344CB8AC3E}">
+        <p14:creationId xmlns:p14="http://schemas.microsoft.com/office/powerpoint/2010/main" val="2241053905"/>
       </p:ext>
     </p:extLst>
   </p:cSld>

</xml_diff>